<commit_message>
Got working versions of most of the final exercises.
</commit_message>
<xml_diff>
--- a/exercises/cisc-813/rddl/slides.pptx
+++ b/exercises/cisc-813/rddl/slides.pptx
@@ -9,34 +9,35 @@
     <p:sldId id="258" r:id="rId3"/>
     <p:sldId id="1690" r:id="rId4"/>
     <p:sldId id="257" r:id="rId5"/>
-    <p:sldId id="261" r:id="rId6"/>
-    <p:sldId id="1705" r:id="rId7"/>
-    <p:sldId id="1694" r:id="rId8"/>
-    <p:sldId id="1706" r:id="rId9"/>
-    <p:sldId id="1707" r:id="rId10"/>
-    <p:sldId id="1708" r:id="rId11"/>
-    <p:sldId id="1715" r:id="rId12"/>
-    <p:sldId id="1716" r:id="rId13"/>
-    <p:sldId id="1717" r:id="rId14"/>
-    <p:sldId id="1712" r:id="rId15"/>
-    <p:sldId id="1713" r:id="rId16"/>
-    <p:sldId id="1714" r:id="rId17"/>
-    <p:sldId id="1711" r:id="rId18"/>
-    <p:sldId id="1709" r:id="rId19"/>
-    <p:sldId id="1718" r:id="rId20"/>
-    <p:sldId id="1719" r:id="rId21"/>
-    <p:sldId id="1720" r:id="rId22"/>
-    <p:sldId id="1721" r:id="rId23"/>
-    <p:sldId id="1722" r:id="rId24"/>
-    <p:sldId id="1695" r:id="rId25"/>
-    <p:sldId id="1701" r:id="rId26"/>
-    <p:sldId id="1696" r:id="rId27"/>
-    <p:sldId id="1702" r:id="rId28"/>
-    <p:sldId id="1697" r:id="rId29"/>
-    <p:sldId id="1703" r:id="rId30"/>
-    <p:sldId id="1698" r:id="rId31"/>
-    <p:sldId id="1704" r:id="rId32"/>
-    <p:sldId id="1684" r:id="rId33"/>
+    <p:sldId id="1723" r:id="rId6"/>
+    <p:sldId id="261" r:id="rId7"/>
+    <p:sldId id="1705" r:id="rId8"/>
+    <p:sldId id="1694" r:id="rId9"/>
+    <p:sldId id="1706" r:id="rId10"/>
+    <p:sldId id="1707" r:id="rId11"/>
+    <p:sldId id="1708" r:id="rId12"/>
+    <p:sldId id="1715" r:id="rId13"/>
+    <p:sldId id="1716" r:id="rId14"/>
+    <p:sldId id="1717" r:id="rId15"/>
+    <p:sldId id="1712" r:id="rId16"/>
+    <p:sldId id="1713" r:id="rId17"/>
+    <p:sldId id="1714" r:id="rId18"/>
+    <p:sldId id="1711" r:id="rId19"/>
+    <p:sldId id="1709" r:id="rId20"/>
+    <p:sldId id="1718" r:id="rId21"/>
+    <p:sldId id="1719" r:id="rId22"/>
+    <p:sldId id="1720" r:id="rId23"/>
+    <p:sldId id="1721" r:id="rId24"/>
+    <p:sldId id="1722" r:id="rId25"/>
+    <p:sldId id="1695" r:id="rId26"/>
+    <p:sldId id="1701" r:id="rId27"/>
+    <p:sldId id="1696" r:id="rId28"/>
+    <p:sldId id="1702" r:id="rId29"/>
+    <p:sldId id="1697" r:id="rId30"/>
+    <p:sldId id="1703" r:id="rId31"/>
+    <p:sldId id="1698" r:id="rId32"/>
+    <p:sldId id="1704" r:id="rId33"/>
+    <p:sldId id="1684" r:id="rId34"/>
   </p:sldIdLst>
   <p:sldSz cx="12192000" cy="6858000"/>
   <p:notesSz cx="6858000" cy="9144000"/>
@@ -709,7 +710,7 @@
           <a:p>
             <a:fld id="{D6D0F569-AC90-44EB-9EF4-4E5C2F5D823C}" type="datetime1">
               <a:rPr lang="en-US" smtClean="0"/>
-              <a:t>1/5/2023</a:t>
+              <a:t>1/6/2023</a:t>
             </a:fld>
             <a:endParaRPr lang="en-US" dirty="0"/>
           </a:p>
@@ -1388,7 +1389,7 @@
           <a:p>
             <a:fld id="{46BA7D41-E8B7-4A0B-B861-3EC4AE88917D}" type="datetime1">
               <a:rPr lang="en-US" smtClean="0"/>
-              <a:t>1/5/2023</a:t>
+              <a:t>1/6/2023</a:t>
             </a:fld>
             <a:endParaRPr lang="en-US" dirty="0"/>
           </a:p>
@@ -2077,7 +2078,7 @@
           <a:p>
             <a:fld id="{A7C34823-0B19-4B4E-A643-7A3B0A3D24D6}" type="datetime1">
               <a:rPr lang="en-US" smtClean="0"/>
-              <a:t>1/5/2023</a:t>
+              <a:t>1/6/2023</a:t>
             </a:fld>
             <a:endParaRPr lang="en-US" dirty="0"/>
           </a:p>
@@ -3200,7 +3201,7 @@
           <a:p>
             <a:fld id="{8C2D79EF-17C8-45D8-9866-DAF5723FC604}" type="datetime1">
               <a:rPr lang="en-US" smtClean="0"/>
-              <a:t>1/5/2023</a:t>
+              <a:t>1/6/2023</a:t>
             </a:fld>
             <a:endParaRPr lang="en-US" dirty="0"/>
           </a:p>
@@ -3955,7 +3956,7 @@
           <a:p>
             <a:fld id="{DFFC2ADC-3680-4013-A757-E4663495DB98}" type="datetime1">
               <a:rPr lang="en-US" smtClean="0"/>
-              <a:t>1/5/2023</a:t>
+              <a:t>1/6/2023</a:t>
             </a:fld>
             <a:endParaRPr lang="en-US" dirty="0"/>
           </a:p>
@@ -4702,7 +4703,7 @@
           <a:p>
             <a:fld id="{4751BA94-5DCA-4F19-960F-0FB2BD5EE85A}" type="datetime1">
               <a:rPr lang="en-US" smtClean="0"/>
-              <a:t>1/5/2023</a:t>
+              <a:t>1/6/2023</a:t>
             </a:fld>
             <a:endParaRPr lang="en-US" dirty="0"/>
           </a:p>
@@ -5596,7 +5597,7 @@
           <a:p>
             <a:fld id="{01BED947-38D9-44AC-8B89-E79758333B77}" type="datetime1">
               <a:rPr lang="en-US" smtClean="0"/>
-              <a:t>1/5/2023</a:t>
+              <a:t>1/6/2023</a:t>
             </a:fld>
             <a:endParaRPr lang="en-US" dirty="0"/>
           </a:p>
@@ -6217,7 +6218,7 @@
           <a:p>
             <a:fld id="{3781E23F-BD3C-4F23-B116-2B758120C8AC}" type="datetime1">
               <a:rPr lang="en-US" smtClean="0"/>
-              <a:t>1/5/2023</a:t>
+              <a:t>1/6/2023</a:t>
             </a:fld>
             <a:endParaRPr lang="en-US" dirty="0"/>
           </a:p>
@@ -6809,7 +6810,7 @@
           <a:p>
             <a:fld id="{473CFAA9-6D59-4D98-869E-ACBDB83B2CA4}" type="datetime1">
               <a:rPr lang="en-US" smtClean="0"/>
-              <a:t>1/5/2023</a:t>
+              <a:t>1/6/2023</a:t>
             </a:fld>
             <a:endParaRPr lang="en-US"/>
           </a:p>
@@ -7601,7 +7602,7 @@
           <a:p>
             <a:fld id="{DC410804-27E3-430A-BB42-B831260DE39A}" type="datetime1">
               <a:rPr lang="en-US" smtClean="0"/>
-              <a:t>1/5/2023</a:t>
+              <a:t>1/6/2023</a:t>
             </a:fld>
             <a:endParaRPr lang="en-US" dirty="0"/>
           </a:p>
@@ -8372,7 +8373,7 @@
           <a:p>
             <a:fld id="{60E22DE3-3D1A-4D53-B9A6-6C7463B8C992}" type="datetime1">
               <a:rPr lang="en-US" smtClean="0"/>
-              <a:t>1/5/2023</a:t>
+              <a:t>1/6/2023</a:t>
             </a:fld>
             <a:endParaRPr lang="en-US" dirty="0"/>
           </a:p>
@@ -8683,7 +8684,7 @@
             <a:fld id="{5ECD8B30-1B71-45A1-8314-D59C86F581E1}" type="datetime1">
               <a:rPr lang="en-US" smtClean="0"/>
               <a:pPr/>
-              <a:t>1/5/2023</a:t>
+              <a:t>1/6/2023</a:t>
             </a:fld>
             <a:endParaRPr lang="en-US" b="1" dirty="0"/>
           </a:p>
@@ -9209,6 +9210,79 @@
       </p:grpSpPr>
       <p:pic>
         <p:nvPicPr>
+          <p:cNvPr id="3" name="Picture 2">
+            <a:extLst>
+              <a:ext uri="{FF2B5EF4-FFF2-40B4-BE49-F238E27FC236}">
+                <a16:creationId xmlns:a16="http://schemas.microsoft.com/office/drawing/2014/main" id="{EFB5A9FE-D28E-5BCC-C5F5-5BB2626BD047}"/>
+              </a:ext>
+            </a:extLst>
+          </p:cNvPr>
+          <p:cNvPicPr>
+            <a:picLocks noChangeAspect="1"/>
+          </p:cNvPicPr>
+          <p:nvPr/>
+        </p:nvPicPr>
+        <p:blipFill>
+          <a:blip r:embed="rId2"/>
+          <a:stretch>
+            <a:fillRect/>
+          </a:stretch>
+        </p:blipFill>
+        <p:spPr>
+          <a:xfrm>
+            <a:off x="4100512" y="1500187"/>
+            <a:ext cx="3990975" cy="3857625"/>
+          </a:xfrm>
+          <a:prstGeom prst="roundRect">
+            <a:avLst>
+              <a:gd name="adj" fmla="val 8594"/>
+            </a:avLst>
+          </a:prstGeom>
+          <a:solidFill>
+            <a:srgbClr val="FFFFFF">
+              <a:shade val="85000"/>
+            </a:srgbClr>
+          </a:solidFill>
+          <a:ln>
+            <a:noFill/>
+          </a:ln>
+          <a:effectLst>
+            <a:reflection blurRad="12700" stA="38000" endPos="28000" dist="5000" dir="5400000" sy="-100000" algn="bl" rotWithShape="0"/>
+          </a:effectLst>
+        </p:spPr>
+      </p:pic>
+    </p:spTree>
+    <p:extLst>
+      <p:ext uri="{BB962C8B-B14F-4D97-AF65-F5344CB8AC3E}">
+        <p14:creationId xmlns:p14="http://schemas.microsoft.com/office/powerpoint/2010/main" val="3810973254"/>
+      </p:ext>
+    </p:extLst>
+  </p:cSld>
+  <p:clrMapOvr>
+    <a:masterClrMapping/>
+  </p:clrMapOvr>
+</p:sld>
+</file>
+
+<file path=ppt/slides/slide11.xml><?xml version="1.0" encoding="utf-8"?>
+<p:sld xmlns:a="http://schemas.openxmlformats.org/drawingml/2006/main" xmlns:r="http://schemas.openxmlformats.org/officeDocument/2006/relationships" xmlns:p="http://schemas.openxmlformats.org/presentationml/2006/main" showMasterSp="0">
+  <p:cSld>
+    <p:spTree>
+      <p:nvGrpSpPr>
+        <p:cNvPr id="1" name=""/>
+        <p:cNvGrpSpPr/>
+        <p:nvPr/>
+      </p:nvGrpSpPr>
+      <p:grpSpPr>
+        <a:xfrm>
+          <a:off x="0" y="0"/>
+          <a:ext cx="0" cy="0"/>
+          <a:chOff x="0" y="0"/>
+          <a:chExt cx="0" cy="0"/>
+        </a:xfrm>
+      </p:grpSpPr>
+      <p:pic>
+        <p:nvPicPr>
           <p:cNvPr id="6" name="Picture 5">
             <a:extLst>
               <a:ext uri="{FF2B5EF4-FFF2-40B4-BE49-F238E27FC236}">
@@ -9263,7 +9337,7 @@
 </p:sld>
 </file>
 
-<file path=ppt/slides/slide11.xml><?xml version="1.0" encoding="utf-8"?>
+<file path=ppt/slides/slide12.xml><?xml version="1.0" encoding="utf-8"?>
 <p:sld xmlns:a="http://schemas.openxmlformats.org/drawingml/2006/main" xmlns:r="http://schemas.openxmlformats.org/officeDocument/2006/relationships" xmlns:p="http://schemas.openxmlformats.org/presentationml/2006/main" showMasterSp="0">
   <p:cSld>
     <p:spTree>
@@ -9336,7 +9410,7 @@
 </p:sld>
 </file>
 
-<file path=ppt/slides/slide12.xml><?xml version="1.0" encoding="utf-8"?>
+<file path=ppt/slides/slide13.xml><?xml version="1.0" encoding="utf-8"?>
 <p:sld xmlns:a="http://schemas.openxmlformats.org/drawingml/2006/main" xmlns:r="http://schemas.openxmlformats.org/officeDocument/2006/relationships" xmlns:p="http://schemas.openxmlformats.org/presentationml/2006/main" showMasterSp="0">
   <p:cSld>
     <p:spTree>
@@ -9409,7 +9483,7 @@
 </p:sld>
 </file>
 
-<file path=ppt/slides/slide13.xml><?xml version="1.0" encoding="utf-8"?>
+<file path=ppt/slides/slide14.xml><?xml version="1.0" encoding="utf-8"?>
 <p:sld xmlns:a="http://schemas.openxmlformats.org/drawingml/2006/main" xmlns:r="http://schemas.openxmlformats.org/officeDocument/2006/relationships" xmlns:p="http://schemas.openxmlformats.org/presentationml/2006/main" showMasterSp="0">
   <p:cSld>
     <p:spTree>
@@ -9491,7 +9565,7 @@
 </p:sld>
 </file>
 
-<file path=ppt/slides/slide14.xml><?xml version="1.0" encoding="utf-8"?>
+<file path=ppt/slides/slide15.xml><?xml version="1.0" encoding="utf-8"?>
 <p:sld xmlns:a="http://schemas.openxmlformats.org/drawingml/2006/main" xmlns:r="http://schemas.openxmlformats.org/officeDocument/2006/relationships" xmlns:p="http://schemas.openxmlformats.org/presentationml/2006/main" showMasterSp="0">
   <p:cSld>
     <p:spTree>
@@ -9573,7 +9647,7 @@
 </p:sld>
 </file>
 
-<file path=ppt/slides/slide15.xml><?xml version="1.0" encoding="utf-8"?>
+<file path=ppt/slides/slide16.xml><?xml version="1.0" encoding="utf-8"?>
 <p:sld xmlns:a="http://schemas.openxmlformats.org/drawingml/2006/main" xmlns:r="http://schemas.openxmlformats.org/officeDocument/2006/relationships" xmlns:p="http://schemas.openxmlformats.org/presentationml/2006/main" showMasterSp="0">
   <p:cSld>
     <p:spTree>
@@ -9643,7 +9717,7 @@
 </p:sld>
 </file>
 
-<file path=ppt/slides/slide16.xml><?xml version="1.0" encoding="utf-8"?>
+<file path=ppt/slides/slide17.xml><?xml version="1.0" encoding="utf-8"?>
 <p:sld xmlns:a="http://schemas.openxmlformats.org/drawingml/2006/main" xmlns:r="http://schemas.openxmlformats.org/officeDocument/2006/relationships" xmlns:p="http://schemas.openxmlformats.org/presentationml/2006/main" showMasterSp="0">
   <p:cSld>
     <p:spTree>
@@ -9716,7 +9790,7 @@
 </p:sld>
 </file>
 
-<file path=ppt/slides/slide17.xml><?xml version="1.0" encoding="utf-8"?>
+<file path=ppt/slides/slide18.xml><?xml version="1.0" encoding="utf-8"?>
 <p:sld xmlns:a="http://schemas.openxmlformats.org/drawingml/2006/main" xmlns:r="http://schemas.openxmlformats.org/officeDocument/2006/relationships" xmlns:p="http://schemas.openxmlformats.org/presentationml/2006/main" showMasterSp="0">
   <p:cSld>
     <p:spTree>
@@ -9789,7 +9863,7 @@
 </p:sld>
 </file>
 
-<file path=ppt/slides/slide18.xml><?xml version="1.0" encoding="utf-8"?>
+<file path=ppt/slides/slide19.xml><?xml version="1.0" encoding="utf-8"?>
 <p:sld xmlns:a="http://schemas.openxmlformats.org/drawingml/2006/main" xmlns:r="http://schemas.openxmlformats.org/officeDocument/2006/relationships" xmlns:p="http://schemas.openxmlformats.org/presentationml/2006/main" showMasterSp="0">
   <p:cSld>
     <p:spTree>
@@ -9862,7 +9936,101 @@
 </p:sld>
 </file>
 
-<file path=ppt/slides/slide19.xml><?xml version="1.0" encoding="utf-8"?>
+<file path=ppt/slides/slide2.xml><?xml version="1.0" encoding="utf-8"?>
+<p:sld xmlns:a="http://schemas.openxmlformats.org/drawingml/2006/main" xmlns:r="http://schemas.openxmlformats.org/officeDocument/2006/relationships" xmlns:p="http://schemas.openxmlformats.org/presentationml/2006/main">
+  <p:cSld>
+    <p:spTree>
+      <p:nvGrpSpPr>
+        <p:cNvPr id="1" name=""/>
+        <p:cNvGrpSpPr/>
+        <p:nvPr/>
+      </p:nvGrpSpPr>
+      <p:grpSpPr>
+        <a:xfrm>
+          <a:off x="0" y="0"/>
+          <a:ext cx="0" cy="0"/>
+          <a:chOff x="0" y="0"/>
+          <a:chExt cx="0" cy="0"/>
+        </a:xfrm>
+      </p:grpSpPr>
+      <p:sp>
+        <p:nvSpPr>
+          <p:cNvPr id="171" name="http://editor.planning.domains/"/>
+          <p:cNvSpPr txBox="1">
+            <a:spLocks noGrp="1"/>
+          </p:cNvSpPr>
+          <p:nvPr>
+            <p:ph type="body" idx="21"/>
+          </p:nvPr>
+        </p:nvSpPr>
+        <p:spPr>
+          <a:xfrm>
+            <a:off x="1190625" y="2086324"/>
+            <a:ext cx="9810750" cy="2685351"/>
+          </a:xfrm>
+          <a:prstGeom prst="rect">
+            <a:avLst/>
+          </a:prstGeom>
+        </p:spPr>
+        <p:txBody>
+          <a:bodyPr/>
+          <a:lstStyle/>
+          <a:p>
+            <a:r>
+              <a:rPr lang="en-US" b="1" dirty="0"/>
+              <a:t>Recommended Editor</a:t>
+            </a:r>
+            <a:r>
+              <a:rPr lang="en-US" dirty="0"/>
+              <a:t>:</a:t>
+            </a:r>
+          </a:p>
+          <a:p>
+            <a:r>
+              <a:rPr lang="en-US" i="1" dirty="0" err="1"/>
+              <a:t>VSCode</a:t>
+            </a:r>
+            <a:r>
+              <a:rPr lang="en-US" i="1" dirty="0"/>
+              <a:t> + PDDL Plugin</a:t>
+            </a:r>
+            <a:br>
+              <a:rPr lang="en-US" i="1" dirty="0"/>
+            </a:br>
+            <a:endParaRPr lang="en-US" i="1" dirty="0"/>
+          </a:p>
+          <a:p>
+            <a:r>
+              <a:rPr lang="en-US" b="1" dirty="0"/>
+              <a:t>Recommended Planner</a:t>
+            </a:r>
+            <a:r>
+              <a:rPr lang="en-US" dirty="0"/>
+              <a:t>:</a:t>
+            </a:r>
+          </a:p>
+          <a:p>
+            <a:r>
+              <a:rPr lang="en-US" i="1" dirty="0" err="1"/>
+              <a:t>pyRDDL</a:t>
+            </a:r>
+            <a:r>
+              <a:rPr lang="en-US" i="1" dirty="0"/>
+              <a:t> + PROST</a:t>
+            </a:r>
+          </a:p>
+        </p:txBody>
+      </p:sp>
+    </p:spTree>
+  </p:cSld>
+  <p:clrMapOvr>
+    <a:masterClrMapping/>
+  </p:clrMapOvr>
+  <p:transition spd="med"/>
+</p:sld>
+</file>
+
+<file path=ppt/slides/slide20.xml><?xml version="1.0" encoding="utf-8"?>
 <p:sld xmlns:a="http://schemas.openxmlformats.org/drawingml/2006/main" xmlns:r="http://schemas.openxmlformats.org/officeDocument/2006/relationships" xmlns:p="http://schemas.openxmlformats.org/presentationml/2006/main" showMasterSp="0">
   <p:cSld>
     <p:spTree>
@@ -9935,101 +10103,7 @@
 </p:sld>
 </file>
 
-<file path=ppt/slides/slide2.xml><?xml version="1.0" encoding="utf-8"?>
-<p:sld xmlns:a="http://schemas.openxmlformats.org/drawingml/2006/main" xmlns:r="http://schemas.openxmlformats.org/officeDocument/2006/relationships" xmlns:p="http://schemas.openxmlformats.org/presentationml/2006/main">
-  <p:cSld>
-    <p:spTree>
-      <p:nvGrpSpPr>
-        <p:cNvPr id="1" name=""/>
-        <p:cNvGrpSpPr/>
-        <p:nvPr/>
-      </p:nvGrpSpPr>
-      <p:grpSpPr>
-        <a:xfrm>
-          <a:off x="0" y="0"/>
-          <a:ext cx="0" cy="0"/>
-          <a:chOff x="0" y="0"/>
-          <a:chExt cx="0" cy="0"/>
-        </a:xfrm>
-      </p:grpSpPr>
-      <p:sp>
-        <p:nvSpPr>
-          <p:cNvPr id="171" name="http://editor.planning.domains/"/>
-          <p:cNvSpPr txBox="1">
-            <a:spLocks noGrp="1"/>
-          </p:cNvSpPr>
-          <p:nvPr>
-            <p:ph type="body" idx="21"/>
-          </p:nvPr>
-        </p:nvSpPr>
-        <p:spPr>
-          <a:xfrm>
-            <a:off x="1190625" y="2086324"/>
-            <a:ext cx="9810750" cy="2685351"/>
-          </a:xfrm>
-          <a:prstGeom prst="rect">
-            <a:avLst/>
-          </a:prstGeom>
-        </p:spPr>
-        <p:txBody>
-          <a:bodyPr/>
-          <a:lstStyle/>
-          <a:p>
-            <a:r>
-              <a:rPr lang="en-US" b="1" dirty="0"/>
-              <a:t>Recommended Editor</a:t>
-            </a:r>
-            <a:r>
-              <a:rPr lang="en-US" dirty="0"/>
-              <a:t>:</a:t>
-            </a:r>
-          </a:p>
-          <a:p>
-            <a:r>
-              <a:rPr lang="en-US" i="1" dirty="0" err="1"/>
-              <a:t>VSCode</a:t>
-            </a:r>
-            <a:r>
-              <a:rPr lang="en-US" i="1" dirty="0"/>
-              <a:t> + PDDL Plugin</a:t>
-            </a:r>
-            <a:br>
-              <a:rPr lang="en-US" i="1" dirty="0"/>
-            </a:br>
-            <a:endParaRPr lang="en-US" i="1" dirty="0"/>
-          </a:p>
-          <a:p>
-            <a:r>
-              <a:rPr lang="en-US" b="1" dirty="0"/>
-              <a:t>Recommended Planner</a:t>
-            </a:r>
-            <a:r>
-              <a:rPr lang="en-US" dirty="0"/>
-              <a:t>:</a:t>
-            </a:r>
-          </a:p>
-          <a:p>
-            <a:r>
-              <a:rPr lang="en-US" i="1" dirty="0" err="1"/>
-              <a:t>pyRDDL</a:t>
-            </a:r>
-            <a:r>
-              <a:rPr lang="en-US" i="1" dirty="0"/>
-              <a:t> + PROST</a:t>
-            </a:r>
-          </a:p>
-        </p:txBody>
-      </p:sp>
-    </p:spTree>
-  </p:cSld>
-  <p:clrMapOvr>
-    <a:masterClrMapping/>
-  </p:clrMapOvr>
-  <p:transition spd="med"/>
-</p:sld>
-</file>
-
-<file path=ppt/slides/slide20.xml><?xml version="1.0" encoding="utf-8"?>
+<file path=ppt/slides/slide21.xml><?xml version="1.0" encoding="utf-8"?>
 <p:sld xmlns:a="http://schemas.openxmlformats.org/drawingml/2006/main" xmlns:r="http://schemas.openxmlformats.org/officeDocument/2006/relationships" xmlns:p="http://schemas.openxmlformats.org/presentationml/2006/main" showMasterSp="0">
   <p:cSld>
     <p:spTree>
@@ -10145,7 +10219,7 @@
 </p:sld>
 </file>
 
-<file path=ppt/slides/slide21.xml><?xml version="1.0" encoding="utf-8"?>
+<file path=ppt/slides/slide22.xml><?xml version="1.0" encoding="utf-8"?>
 <p:sld xmlns:a="http://schemas.openxmlformats.org/drawingml/2006/main" xmlns:r="http://schemas.openxmlformats.org/officeDocument/2006/relationships" xmlns:p="http://schemas.openxmlformats.org/presentationml/2006/main" showMasterSp="0">
   <p:cSld>
     <p:spTree>
@@ -10204,7 +10278,7 @@
 </p:sld>
 </file>
 
-<file path=ppt/slides/slide22.xml><?xml version="1.0" encoding="utf-8"?>
+<file path=ppt/slides/slide23.xml><?xml version="1.0" encoding="utf-8"?>
 <p:sld xmlns:a="http://schemas.openxmlformats.org/drawingml/2006/main" xmlns:r="http://schemas.openxmlformats.org/officeDocument/2006/relationships" xmlns:p="http://schemas.openxmlformats.org/presentationml/2006/main" showMasterSp="0">
   <p:cSld>
     <p:spTree>
@@ -10234,7 +10308,7 @@
 </p:sld>
 </file>
 
-<file path=ppt/slides/slide23.xml><?xml version="1.0" encoding="utf-8"?>
+<file path=ppt/slides/slide24.xml><?xml version="1.0" encoding="utf-8"?>
 <p:sld xmlns:a="http://schemas.openxmlformats.org/drawingml/2006/main" xmlns:r="http://schemas.openxmlformats.org/officeDocument/2006/relationships" xmlns:p="http://schemas.openxmlformats.org/presentationml/2006/main" showMasterSp="0">
   <p:cSld>
     <p:spTree>
@@ -10264,7 +10338,7 @@
 </p:sld>
 </file>
 
-<file path=ppt/slides/slide24.xml><?xml version="1.0" encoding="utf-8"?>
+<file path=ppt/slides/slide25.xml><?xml version="1.0" encoding="utf-8"?>
 <p:sld xmlns:a="http://schemas.openxmlformats.org/drawingml/2006/main" xmlns:r="http://schemas.openxmlformats.org/officeDocument/2006/relationships" xmlns:p="http://schemas.openxmlformats.org/presentationml/2006/main" showMasterSp="0">
   <p:cSld>
     <p:spTree>
@@ -10376,7 +10450,7 @@
 </p:sld>
 </file>
 
-<file path=ppt/slides/slide25.xml><?xml version="1.0" encoding="utf-8"?>
+<file path=ppt/slides/slide26.xml><?xml version="1.0" encoding="utf-8"?>
 <p:sld xmlns:a="http://schemas.openxmlformats.org/drawingml/2006/main" xmlns:r="http://schemas.openxmlformats.org/officeDocument/2006/relationships" xmlns:p="http://schemas.openxmlformats.org/presentationml/2006/main" showMasterSp="0">
   <p:cSld>
     <p:spTree>
@@ -10461,7 +10535,7 @@
 </p:sld>
 </file>
 
-<file path=ppt/slides/slide26.xml><?xml version="1.0" encoding="utf-8"?>
+<file path=ppt/slides/slide27.xml><?xml version="1.0" encoding="utf-8"?>
 <p:sld xmlns:a="http://schemas.openxmlformats.org/drawingml/2006/main" xmlns:r="http://schemas.openxmlformats.org/officeDocument/2006/relationships" xmlns:p="http://schemas.openxmlformats.org/presentationml/2006/main" showMasterSp="0">
   <p:cSld>
     <p:spTree>
@@ -10568,7 +10642,7 @@
 </p:sld>
 </file>
 
-<file path=ppt/slides/slide27.xml><?xml version="1.0" encoding="utf-8"?>
+<file path=ppt/slides/slide28.xml><?xml version="1.0" encoding="utf-8"?>
 <p:sld xmlns:a="http://schemas.openxmlformats.org/drawingml/2006/main" xmlns:r="http://schemas.openxmlformats.org/officeDocument/2006/relationships" xmlns:p="http://schemas.openxmlformats.org/presentationml/2006/main" showMasterSp="0">
   <p:cSld>
     <p:spTree>
@@ -10653,7 +10727,7 @@
 </p:sld>
 </file>
 
-<file path=ppt/slides/slide28.xml><?xml version="1.0" encoding="utf-8"?>
+<file path=ppt/slides/slide29.xml><?xml version="1.0" encoding="utf-8"?>
 <p:sld xmlns:a="http://schemas.openxmlformats.org/drawingml/2006/main" xmlns:r="http://schemas.openxmlformats.org/officeDocument/2006/relationships" xmlns:p="http://schemas.openxmlformats.org/presentationml/2006/main" showMasterSp="0">
   <p:cSld>
     <p:spTree>
@@ -10757,91 +10831,6 @@
   <p:clrMapOvr>
     <a:masterClrMapping/>
   </p:clrMapOvr>
-</p:sld>
-</file>
-
-<file path=ppt/slides/slide29.xml><?xml version="1.0" encoding="utf-8"?>
-<p:sld xmlns:a="http://schemas.openxmlformats.org/drawingml/2006/main" xmlns:r="http://schemas.openxmlformats.org/officeDocument/2006/relationships" xmlns:p="http://schemas.openxmlformats.org/presentationml/2006/main" showMasterSp="0">
-  <p:cSld>
-    <p:spTree>
-      <p:nvGrpSpPr>
-        <p:cNvPr id="1" name=""/>
-        <p:cNvGrpSpPr/>
-        <p:nvPr/>
-      </p:nvGrpSpPr>
-      <p:grpSpPr>
-        <a:xfrm>
-          <a:off x="0" y="0"/>
-          <a:ext cx="0" cy="0"/>
-          <a:chOff x="0" y="0"/>
-          <a:chExt cx="0" cy="0"/>
-        </a:xfrm>
-      </p:grpSpPr>
-      <p:sp>
-        <p:nvSpPr>
-          <p:cNvPr id="5" name="Content Placeholder 4">
-            <a:extLst>
-              <a:ext uri="{FF2B5EF4-FFF2-40B4-BE49-F238E27FC236}">
-                <a16:creationId xmlns:a16="http://schemas.microsoft.com/office/drawing/2014/main" id="{916B2140-6178-6477-FAC2-4FC081B9C2C5}"/>
-              </a:ext>
-            </a:extLst>
-          </p:cNvPr>
-          <p:cNvSpPr>
-            <a:spLocks noGrp="1"/>
-          </p:cNvSpPr>
-          <p:nvPr>
-            <p:ph idx="1"/>
-          </p:nvPr>
-        </p:nvSpPr>
-        <p:spPr/>
-        <p:txBody>
-          <a:bodyPr/>
-          <a:lstStyle/>
-          <a:p>
-            <a:pPr marL="0" indent="0">
-              <a:buNone/>
-            </a:pPr>
-            <a:endParaRPr lang="en-CA" dirty="0"/>
-          </a:p>
-          <a:p>
-            <a:endParaRPr lang="en-CA" dirty="0"/>
-          </a:p>
-          <a:p>
-            <a:endParaRPr lang="en-CA" dirty="0"/>
-          </a:p>
-          <a:p>
-            <a:pPr marL="0" indent="0" algn="ctr">
-              <a:buNone/>
-            </a:pPr>
-            <a:r>
-              <a:rPr lang="en-CA" sz="2800" dirty="0"/>
-              <a:t>http://editor.planning.domains/planning-course/adl/boarded</a:t>
-            </a:r>
-          </a:p>
-        </p:txBody>
-      </p:sp>
-    </p:spTree>
-    <p:extLst>
-      <p:ext uri="{BB962C8B-B14F-4D97-AF65-F5344CB8AC3E}">
-        <p14:creationId xmlns:p14="http://schemas.microsoft.com/office/powerpoint/2010/main" val="646542654"/>
-      </p:ext>
-    </p:extLst>
-  </p:cSld>
-  <p:clrMapOvr>
-    <a:masterClrMapping/>
-  </p:clrMapOvr>
-  <mc:AlternateContent xmlns:mc="http://schemas.openxmlformats.org/markup-compatibility/2006" xmlns:p14="http://schemas.microsoft.com/office/powerpoint/2010/main">
-    <mc:Choice Requires="p14">
-      <p:transition spd="med" p14:dur="700">
-        <p:fade/>
-      </p:transition>
-    </mc:Choice>
-    <mc:Fallback xmlns="">
-      <p:transition spd="med">
-        <p:fade/>
-      </p:transition>
-    </mc:Fallback>
-  </mc:AlternateContent>
 </p:sld>
 </file>
 
@@ -10946,6 +10935,91 @@
       </p:grpSpPr>
       <p:sp>
         <p:nvSpPr>
+          <p:cNvPr id="5" name="Content Placeholder 4">
+            <a:extLst>
+              <a:ext uri="{FF2B5EF4-FFF2-40B4-BE49-F238E27FC236}">
+                <a16:creationId xmlns:a16="http://schemas.microsoft.com/office/drawing/2014/main" id="{916B2140-6178-6477-FAC2-4FC081B9C2C5}"/>
+              </a:ext>
+            </a:extLst>
+          </p:cNvPr>
+          <p:cNvSpPr>
+            <a:spLocks noGrp="1"/>
+          </p:cNvSpPr>
+          <p:nvPr>
+            <p:ph idx="1"/>
+          </p:nvPr>
+        </p:nvSpPr>
+        <p:spPr/>
+        <p:txBody>
+          <a:bodyPr/>
+          <a:lstStyle/>
+          <a:p>
+            <a:pPr marL="0" indent="0">
+              <a:buNone/>
+            </a:pPr>
+            <a:endParaRPr lang="en-CA" dirty="0"/>
+          </a:p>
+          <a:p>
+            <a:endParaRPr lang="en-CA" dirty="0"/>
+          </a:p>
+          <a:p>
+            <a:endParaRPr lang="en-CA" dirty="0"/>
+          </a:p>
+          <a:p>
+            <a:pPr marL="0" indent="0" algn="ctr">
+              <a:buNone/>
+            </a:pPr>
+            <a:r>
+              <a:rPr lang="en-CA" sz="2800" dirty="0"/>
+              <a:t>http://editor.planning.domains/planning-course/adl/boarded</a:t>
+            </a:r>
+          </a:p>
+        </p:txBody>
+      </p:sp>
+    </p:spTree>
+    <p:extLst>
+      <p:ext uri="{BB962C8B-B14F-4D97-AF65-F5344CB8AC3E}">
+        <p14:creationId xmlns:p14="http://schemas.microsoft.com/office/powerpoint/2010/main" val="646542654"/>
+      </p:ext>
+    </p:extLst>
+  </p:cSld>
+  <p:clrMapOvr>
+    <a:masterClrMapping/>
+  </p:clrMapOvr>
+  <mc:AlternateContent xmlns:mc="http://schemas.openxmlformats.org/markup-compatibility/2006" xmlns:p14="http://schemas.microsoft.com/office/powerpoint/2010/main">
+    <mc:Choice Requires="p14">
+      <p:transition spd="med" p14:dur="700">
+        <p:fade/>
+      </p:transition>
+    </mc:Choice>
+    <mc:Fallback xmlns="">
+      <p:transition spd="med">
+        <p:fade/>
+      </p:transition>
+    </mc:Fallback>
+  </mc:AlternateContent>
+</p:sld>
+</file>
+
+<file path=ppt/slides/slide31.xml><?xml version="1.0" encoding="utf-8"?>
+<p:sld xmlns:a="http://schemas.openxmlformats.org/drawingml/2006/main" xmlns:r="http://schemas.openxmlformats.org/officeDocument/2006/relationships" xmlns:p="http://schemas.openxmlformats.org/presentationml/2006/main" showMasterSp="0">
+  <p:cSld>
+    <p:spTree>
+      <p:nvGrpSpPr>
+        <p:cNvPr id="1" name=""/>
+        <p:cNvGrpSpPr/>
+        <p:nvPr/>
+      </p:nvGrpSpPr>
+      <p:grpSpPr>
+        <a:xfrm>
+          <a:off x="0" y="0"/>
+          <a:ext cx="0" cy="0"/>
+          <a:chOff x="0" y="0"/>
+          <a:chExt cx="0" cy="0"/>
+        </a:xfrm>
+      </p:grpSpPr>
+      <p:sp>
+        <p:nvSpPr>
           <p:cNvPr id="4" name="Title 3">
             <a:extLst>
               <a:ext uri="{FF2B5EF4-FFF2-40B4-BE49-F238E27FC236}">
@@ -11034,7 +11108,7 @@
 </p:sld>
 </file>
 
-<file path=ppt/slides/slide31.xml><?xml version="1.0" encoding="utf-8"?>
+<file path=ppt/slides/slide32.xml><?xml version="1.0" encoding="utf-8"?>
 <p:sld xmlns:a="http://schemas.openxmlformats.org/drawingml/2006/main" xmlns:r="http://schemas.openxmlformats.org/officeDocument/2006/relationships" xmlns:p="http://schemas.openxmlformats.org/presentationml/2006/main" showMasterSp="0">
   <p:cSld>
     <p:spTree>
@@ -11119,7 +11193,7 @@
 </p:sld>
 </file>
 
-<file path=ppt/slides/slide32.xml><?xml version="1.0" encoding="utf-8"?>
+<file path=ppt/slides/slide33.xml><?xml version="1.0" encoding="utf-8"?>
 <p:sld xmlns:a="http://schemas.openxmlformats.org/drawingml/2006/main" xmlns:r="http://schemas.openxmlformats.org/officeDocument/2006/relationships" xmlns:p="http://schemas.openxmlformats.org/presentationml/2006/main" showMasterSp="0">
   <p:cSld>
     <p:spTree>
@@ -11286,6 +11360,184 @@
       </p:grpSpPr>
       <p:sp>
         <p:nvSpPr>
+          <p:cNvPr id="3" name="Title 2">
+            <a:extLst>
+              <a:ext uri="{FF2B5EF4-FFF2-40B4-BE49-F238E27FC236}">
+                <a16:creationId xmlns:a16="http://schemas.microsoft.com/office/drawing/2014/main" id="{06789630-9B0F-0775-9CF4-6BCE85CCD403}"/>
+              </a:ext>
+            </a:extLst>
+          </p:cNvPr>
+          <p:cNvSpPr>
+            <a:spLocks noGrp="1"/>
+          </p:cNvSpPr>
+          <p:nvPr>
+            <p:ph type="title"/>
+          </p:nvPr>
+        </p:nvSpPr>
+        <p:spPr/>
+        <p:txBody>
+          <a:bodyPr/>
+          <a:lstStyle/>
+          <a:p>
+            <a:r>
+              <a:rPr lang="en-US" dirty="0"/>
+              <a:t>Gotchas!!</a:t>
+            </a:r>
+            <a:endParaRPr lang="en-CA" dirty="0"/>
+          </a:p>
+        </p:txBody>
+      </p:sp>
+      <p:sp>
+        <p:nvSpPr>
+          <p:cNvPr id="4" name="Content Placeholder 3">
+            <a:extLst>
+              <a:ext uri="{FF2B5EF4-FFF2-40B4-BE49-F238E27FC236}">
+                <a16:creationId xmlns:a16="http://schemas.microsoft.com/office/drawing/2014/main" id="{7A08B150-AC72-50DB-ED3E-62216D38E5AF}"/>
+              </a:ext>
+            </a:extLst>
+          </p:cNvPr>
+          <p:cNvSpPr>
+            <a:spLocks noGrp="1"/>
+          </p:cNvSpPr>
+          <p:nvPr>
+            <p:ph idx="1"/>
+          </p:nvPr>
+        </p:nvSpPr>
+        <p:spPr/>
+        <p:txBody>
+          <a:bodyPr/>
+          <a:lstStyle/>
+          <a:p>
+            <a:r>
+              <a:rPr lang="en-US" dirty="0"/>
+              <a:t>Careful with brackets:</a:t>
+            </a:r>
+          </a:p>
+          <a:p>
+            <a:pPr lvl="1"/>
+            <a:r>
+              <a:rPr lang="en-US" dirty="0"/>
+              <a:t>Good: </a:t>
+            </a:r>
+            <a:r>
+              <a:rPr lang="en-US" dirty="0" err="1"/>
+              <a:t>func</a:t>
+            </a:r>
+            <a:r>
+              <a:rPr lang="en-US" dirty="0"/>
+              <a:t>(?x, ?y)</a:t>
+            </a:r>
+          </a:p>
+          <a:p>
+            <a:pPr lvl="1"/>
+            <a:r>
+              <a:rPr lang="en-US" dirty="0"/>
+              <a:t>Bad: </a:t>
+            </a:r>
+            <a:r>
+              <a:rPr lang="en-US" dirty="0" err="1"/>
+              <a:t>func</a:t>
+            </a:r>
+            <a:r>
+              <a:rPr lang="en-US" dirty="0"/>
+              <a:t>(?</a:t>
+            </a:r>
+            <a:r>
+              <a:rPr lang="en-US" dirty="0" err="1"/>
+              <a:t>x,?y</a:t>
+            </a:r>
+            <a:r>
+              <a:rPr lang="en-US" dirty="0"/>
+              <a:t>)</a:t>
+            </a:r>
+            <a:br>
+              <a:rPr lang="en-US" dirty="0"/>
+            </a:br>
+            <a:endParaRPr lang="en-US" dirty="0"/>
+          </a:p>
+          <a:p>
+            <a:r>
+              <a:rPr lang="en-US" dirty="0"/>
+              <a:t>Careful with multi-line equality:</a:t>
+            </a:r>
+          </a:p>
+          <a:p>
+            <a:pPr lvl="1"/>
+            <a:r>
+              <a:rPr lang="en-US" dirty="0"/>
+              <a:t>Need to have a space after the “=” sign</a:t>
+            </a:r>
+            <a:br>
+              <a:rPr lang="en-US" dirty="0"/>
+            </a:br>
+            <a:endParaRPr lang="en-US" dirty="0"/>
+          </a:p>
+          <a:p>
+            <a:r>
+              <a:rPr lang="en-US" dirty="0"/>
+              <a:t>Depth of trial is given in the instance (# of trials on the </a:t>
+            </a:r>
+            <a:r>
+              <a:rPr lang="en-US" dirty="0" err="1"/>
+              <a:t>cmd</a:t>
+            </a:r>
+            <a:r>
+              <a:rPr lang="en-US" dirty="0"/>
+              <a:t>-line)</a:t>
+            </a:r>
+            <a:br>
+              <a:rPr lang="en-US" dirty="0"/>
+            </a:br>
+            <a:endParaRPr lang="en-US" dirty="0"/>
+          </a:p>
+          <a:p>
+            <a:r>
+              <a:rPr lang="en-US" dirty="0"/>
+              <a:t>If </a:t>
+            </a:r>
+            <a:r>
+              <a:rPr lang="en-US" dirty="0" err="1"/>
+              <a:t>pyRDDL</a:t>
+            </a:r>
+            <a:r>
+              <a:rPr lang="en-US" dirty="0"/>
+              <a:t> states “Address already in use”, restart the docker</a:t>
+            </a:r>
+          </a:p>
+        </p:txBody>
+      </p:sp>
+    </p:spTree>
+    <p:extLst>
+      <p:ext uri="{BB962C8B-B14F-4D97-AF65-F5344CB8AC3E}">
+        <p14:creationId xmlns:p14="http://schemas.microsoft.com/office/powerpoint/2010/main" val="4184907828"/>
+      </p:ext>
+    </p:extLst>
+  </p:cSld>
+  <p:clrMapOvr>
+    <a:masterClrMapping/>
+  </p:clrMapOvr>
+</p:sld>
+</file>
+
+<file path=ppt/slides/slide6.xml><?xml version="1.0" encoding="utf-8"?>
+<p:sld xmlns:a="http://schemas.openxmlformats.org/drawingml/2006/main" xmlns:r="http://schemas.openxmlformats.org/officeDocument/2006/relationships" xmlns:p="http://schemas.openxmlformats.org/presentationml/2006/main">
+  <p:cSld>
+    <p:spTree>
+      <p:nvGrpSpPr>
+        <p:cNvPr id="1" name=""/>
+        <p:cNvGrpSpPr/>
+        <p:nvPr/>
+      </p:nvGrpSpPr>
+      <p:grpSpPr>
+        <a:xfrm>
+          <a:off x="0" y="0"/>
+          <a:ext cx="0" cy="0"/>
+          <a:chOff x="0" y="0"/>
+          <a:chExt cx="0" cy="0"/>
+        </a:xfrm>
+      </p:grpSpPr>
+      <p:sp>
+        <p:nvSpPr>
           <p:cNvPr id="178" name="Moving Crates"/>
           <p:cNvSpPr txBox="1">
             <a:spLocks noGrp="1"/>
@@ -11530,7 +11782,7 @@
 </p:sld>
 </file>
 
-<file path=ppt/slides/slide6.xml><?xml version="1.0" encoding="utf-8"?>
+<file path=ppt/slides/slide7.xml><?xml version="1.0" encoding="utf-8"?>
 <p:sld xmlns:a="http://schemas.openxmlformats.org/drawingml/2006/main" xmlns:r="http://schemas.openxmlformats.org/officeDocument/2006/relationships" xmlns:p="http://schemas.openxmlformats.org/presentationml/2006/main" showMasterSp="0">
   <p:cSld>
     <p:spTree>
@@ -11603,7 +11855,7 @@
 </p:sld>
 </file>
 
-<file path=ppt/slides/slide7.xml><?xml version="1.0" encoding="utf-8"?>
+<file path=ppt/slides/slide8.xml><?xml version="1.0" encoding="utf-8"?>
 <p:sld xmlns:a="http://schemas.openxmlformats.org/drawingml/2006/main" xmlns:r="http://schemas.openxmlformats.org/officeDocument/2006/relationships" xmlns:p="http://schemas.openxmlformats.org/presentationml/2006/main" showMasterSp="0">
   <p:cSld>
     <p:spTree>
@@ -11704,7 +11956,7 @@
 </p:sld>
 </file>
 
-<file path=ppt/slides/slide8.xml><?xml version="1.0" encoding="utf-8"?>
+<file path=ppt/slides/slide9.xml><?xml version="1.0" encoding="utf-8"?>
 <p:sld xmlns:a="http://schemas.openxmlformats.org/drawingml/2006/main" xmlns:r="http://schemas.openxmlformats.org/officeDocument/2006/relationships" xmlns:p="http://schemas.openxmlformats.org/presentationml/2006/main" showMasterSp="0">
   <p:cSld>
     <p:spTree>
@@ -11768,79 +12020,6 @@
     <p:extLst>
       <p:ext uri="{BB962C8B-B14F-4D97-AF65-F5344CB8AC3E}">
         <p14:creationId xmlns:p14="http://schemas.microsoft.com/office/powerpoint/2010/main" val="2842933087"/>
-      </p:ext>
-    </p:extLst>
-  </p:cSld>
-  <p:clrMapOvr>
-    <a:masterClrMapping/>
-  </p:clrMapOvr>
-</p:sld>
-</file>
-
-<file path=ppt/slides/slide9.xml><?xml version="1.0" encoding="utf-8"?>
-<p:sld xmlns:a="http://schemas.openxmlformats.org/drawingml/2006/main" xmlns:r="http://schemas.openxmlformats.org/officeDocument/2006/relationships" xmlns:p="http://schemas.openxmlformats.org/presentationml/2006/main" showMasterSp="0">
-  <p:cSld>
-    <p:spTree>
-      <p:nvGrpSpPr>
-        <p:cNvPr id="1" name=""/>
-        <p:cNvGrpSpPr/>
-        <p:nvPr/>
-      </p:nvGrpSpPr>
-      <p:grpSpPr>
-        <a:xfrm>
-          <a:off x="0" y="0"/>
-          <a:ext cx="0" cy="0"/>
-          <a:chOff x="0" y="0"/>
-          <a:chExt cx="0" cy="0"/>
-        </a:xfrm>
-      </p:grpSpPr>
-      <p:pic>
-        <p:nvPicPr>
-          <p:cNvPr id="3" name="Picture 2">
-            <a:extLst>
-              <a:ext uri="{FF2B5EF4-FFF2-40B4-BE49-F238E27FC236}">
-                <a16:creationId xmlns:a16="http://schemas.microsoft.com/office/drawing/2014/main" id="{EFB5A9FE-D28E-5BCC-C5F5-5BB2626BD047}"/>
-              </a:ext>
-            </a:extLst>
-          </p:cNvPr>
-          <p:cNvPicPr>
-            <a:picLocks noChangeAspect="1"/>
-          </p:cNvPicPr>
-          <p:nvPr/>
-        </p:nvPicPr>
-        <p:blipFill>
-          <a:blip r:embed="rId2"/>
-          <a:stretch>
-            <a:fillRect/>
-          </a:stretch>
-        </p:blipFill>
-        <p:spPr>
-          <a:xfrm>
-            <a:off x="4100512" y="1500187"/>
-            <a:ext cx="3990975" cy="3857625"/>
-          </a:xfrm>
-          <a:prstGeom prst="roundRect">
-            <a:avLst>
-              <a:gd name="adj" fmla="val 8594"/>
-            </a:avLst>
-          </a:prstGeom>
-          <a:solidFill>
-            <a:srgbClr val="FFFFFF">
-              <a:shade val="85000"/>
-            </a:srgbClr>
-          </a:solidFill>
-          <a:ln>
-            <a:noFill/>
-          </a:ln>
-          <a:effectLst>
-            <a:reflection blurRad="12700" stA="38000" endPos="28000" dist="5000" dir="5400000" sy="-100000" algn="bl" rotWithShape="0"/>
-          </a:effectLst>
-        </p:spPr>
-      </p:pic>
-    </p:spTree>
-    <p:extLst>
-      <p:ext uri="{BB962C8B-B14F-4D97-AF65-F5344CB8AC3E}">
-        <p14:creationId xmlns:p14="http://schemas.microsoft.com/office/powerpoint/2010/main" val="3810973254"/>
       </p:ext>
     </p:extLst>
   </p:cSld>

</xml_diff>

<commit_message>
Finished up the final rddl tasks.
</commit_message>
<xml_diff>
--- a/exercises/cisc-813/rddl/slides.pptx
+++ b/exercises/cisc-813/rddl/slides.pptx
@@ -27,17 +27,15 @@
     <p:sldId id="1718" r:id="rId21"/>
     <p:sldId id="1719" r:id="rId22"/>
     <p:sldId id="1720" r:id="rId23"/>
-    <p:sldId id="1721" r:id="rId24"/>
-    <p:sldId id="1722" r:id="rId25"/>
-    <p:sldId id="1695" r:id="rId26"/>
-    <p:sldId id="1701" r:id="rId27"/>
-    <p:sldId id="1696" r:id="rId28"/>
-    <p:sldId id="1702" r:id="rId29"/>
-    <p:sldId id="1697" r:id="rId30"/>
-    <p:sldId id="1703" r:id="rId31"/>
-    <p:sldId id="1698" r:id="rId32"/>
-    <p:sldId id="1704" r:id="rId33"/>
-    <p:sldId id="1684" r:id="rId34"/>
+    <p:sldId id="1695" r:id="rId24"/>
+    <p:sldId id="1701" r:id="rId25"/>
+    <p:sldId id="1696" r:id="rId26"/>
+    <p:sldId id="1702" r:id="rId27"/>
+    <p:sldId id="1697" r:id="rId28"/>
+    <p:sldId id="1703" r:id="rId29"/>
+    <p:sldId id="1698" r:id="rId30"/>
+    <p:sldId id="1704" r:id="rId31"/>
+    <p:sldId id="1684" r:id="rId32"/>
   </p:sldIdLst>
   <p:sldSz cx="12192000" cy="6858000"/>
   <p:notesSz cx="6858000" cy="9144000"/>
@@ -710,7 +708,7 @@
           <a:p>
             <a:fld id="{D6D0F569-AC90-44EB-9EF4-4E5C2F5D823C}" type="datetime1">
               <a:rPr lang="en-US" smtClean="0"/>
-              <a:t>1/6/2023</a:t>
+              <a:t>1/8/2023</a:t>
             </a:fld>
             <a:endParaRPr lang="en-US" dirty="0"/>
           </a:p>
@@ -1389,7 +1387,7 @@
           <a:p>
             <a:fld id="{46BA7D41-E8B7-4A0B-B861-3EC4AE88917D}" type="datetime1">
               <a:rPr lang="en-US" smtClean="0"/>
-              <a:t>1/6/2023</a:t>
+              <a:t>1/8/2023</a:t>
             </a:fld>
             <a:endParaRPr lang="en-US" dirty="0"/>
           </a:p>
@@ -2078,7 +2076,7 @@
           <a:p>
             <a:fld id="{A7C34823-0B19-4B4E-A643-7A3B0A3D24D6}" type="datetime1">
               <a:rPr lang="en-US" smtClean="0"/>
-              <a:t>1/6/2023</a:t>
+              <a:t>1/8/2023</a:t>
             </a:fld>
             <a:endParaRPr lang="en-US" dirty="0"/>
           </a:p>
@@ -3201,7 +3199,7 @@
           <a:p>
             <a:fld id="{8C2D79EF-17C8-45D8-9866-DAF5723FC604}" type="datetime1">
               <a:rPr lang="en-US" smtClean="0"/>
-              <a:t>1/6/2023</a:t>
+              <a:t>1/8/2023</a:t>
             </a:fld>
             <a:endParaRPr lang="en-US" dirty="0"/>
           </a:p>
@@ -3956,7 +3954,7 @@
           <a:p>
             <a:fld id="{DFFC2ADC-3680-4013-A757-E4663495DB98}" type="datetime1">
               <a:rPr lang="en-US" smtClean="0"/>
-              <a:t>1/6/2023</a:t>
+              <a:t>1/8/2023</a:t>
             </a:fld>
             <a:endParaRPr lang="en-US" dirty="0"/>
           </a:p>
@@ -4703,7 +4701,7 @@
           <a:p>
             <a:fld id="{4751BA94-5DCA-4F19-960F-0FB2BD5EE85A}" type="datetime1">
               <a:rPr lang="en-US" smtClean="0"/>
-              <a:t>1/6/2023</a:t>
+              <a:t>1/8/2023</a:t>
             </a:fld>
             <a:endParaRPr lang="en-US" dirty="0"/>
           </a:p>
@@ -5597,7 +5595,7 @@
           <a:p>
             <a:fld id="{01BED947-38D9-44AC-8B89-E79758333B77}" type="datetime1">
               <a:rPr lang="en-US" smtClean="0"/>
-              <a:t>1/6/2023</a:t>
+              <a:t>1/8/2023</a:t>
             </a:fld>
             <a:endParaRPr lang="en-US" dirty="0"/>
           </a:p>
@@ -6218,7 +6216,7 @@
           <a:p>
             <a:fld id="{3781E23F-BD3C-4F23-B116-2B758120C8AC}" type="datetime1">
               <a:rPr lang="en-US" smtClean="0"/>
-              <a:t>1/6/2023</a:t>
+              <a:t>1/8/2023</a:t>
             </a:fld>
             <a:endParaRPr lang="en-US" dirty="0"/>
           </a:p>
@@ -6810,7 +6808,7 @@
           <a:p>
             <a:fld id="{473CFAA9-6D59-4D98-869E-ACBDB83B2CA4}" type="datetime1">
               <a:rPr lang="en-US" smtClean="0"/>
-              <a:t>1/6/2023</a:t>
+              <a:t>1/8/2023</a:t>
             </a:fld>
             <a:endParaRPr lang="en-US"/>
           </a:p>
@@ -7602,7 +7600,7 @@
           <a:p>
             <a:fld id="{DC410804-27E3-430A-BB42-B831260DE39A}" type="datetime1">
               <a:rPr lang="en-US" smtClean="0"/>
-              <a:t>1/6/2023</a:t>
+              <a:t>1/8/2023</a:t>
             </a:fld>
             <a:endParaRPr lang="en-US" dirty="0"/>
           </a:p>
@@ -8373,7 +8371,7 @@
           <a:p>
             <a:fld id="{60E22DE3-3D1A-4D53-B9A6-6C7463B8C992}" type="datetime1">
               <a:rPr lang="en-US" smtClean="0"/>
-              <a:t>1/6/2023</a:t>
+              <a:t>1/8/2023</a:t>
             </a:fld>
             <a:endParaRPr lang="en-US" dirty="0"/>
           </a:p>
@@ -8684,7 +8682,7 @@
             <a:fld id="{5ECD8B30-1B71-45A1-8314-D59C86F581E1}" type="datetime1">
               <a:rPr lang="en-US" smtClean="0"/>
               <a:pPr/>
-              <a:t>1/6/2023</a:t>
+              <a:t>1/8/2023</a:t>
             </a:fld>
             <a:endParaRPr lang="en-US" b="1" dirty="0"/>
           </a:p>
@@ -10265,6 +10263,150 @@
           </a:p>
         </p:txBody>
       </p:sp>
+      <p:sp>
+        <p:nvSpPr>
+          <p:cNvPr id="3" name="Content Placeholder 2">
+            <a:extLst>
+              <a:ext uri="{FF2B5EF4-FFF2-40B4-BE49-F238E27FC236}">
+                <a16:creationId xmlns:a16="http://schemas.microsoft.com/office/drawing/2014/main" id="{D3B74232-B363-91B5-1EC5-11EA0258A32E}"/>
+              </a:ext>
+            </a:extLst>
+          </p:cNvPr>
+          <p:cNvSpPr>
+            <a:spLocks noGrp="1"/>
+          </p:cNvSpPr>
+          <p:nvPr>
+            <p:ph idx="1"/>
+          </p:nvPr>
+        </p:nvSpPr>
+        <p:spPr/>
+        <p:txBody>
+          <a:bodyPr/>
+          <a:lstStyle/>
+          <a:p>
+            <a:pPr marL="514350" indent="-514350">
+              <a:buFont typeface="+mj-lt"/>
+              <a:buAutoNum type="arabicPeriod"/>
+            </a:pPr>
+            <a:r>
+              <a:rPr lang="en-CA" dirty="0"/>
+              <a:t>Get the docker container up and going</a:t>
+            </a:r>
+            <a:br>
+              <a:rPr lang="en-CA" dirty="0"/>
+            </a:br>
+            <a:endParaRPr lang="en-CA" dirty="0"/>
+          </a:p>
+          <a:p>
+            <a:pPr marL="514350" indent="-514350">
+              <a:buFont typeface="+mj-lt"/>
+              <a:buAutoNum type="arabicPeriod"/>
+            </a:pPr>
+            <a:r>
+              <a:rPr lang="en-CA" dirty="0"/>
+              <a:t>Fire it up (aha!):</a:t>
+            </a:r>
+            <a:br>
+              <a:rPr lang="en-CA" dirty="0"/>
+            </a:br>
+            <a:br>
+              <a:rPr lang="en-CA" dirty="0"/>
+            </a:br>
+            <a:r>
+              <a:rPr lang="en-CA" dirty="0"/>
+              <a:t>	</a:t>
+            </a:r>
+            <a:r>
+              <a:rPr lang="en-CA" b="1" dirty="0"/>
+              <a:t>docker run -it -v $(</a:t>
+            </a:r>
+            <a:r>
+              <a:rPr lang="en-CA" b="1" dirty="0" err="1"/>
+              <a:t>pwd</a:t>
+            </a:r>
+            <a:r>
+              <a:rPr lang="en-CA" b="1" dirty="0"/>
+              <a:t>)/PROJECT cisc813/</a:t>
+            </a:r>
+            <a:r>
+              <a:rPr lang="en-CA" b="1" dirty="0" err="1"/>
+              <a:t>prost</a:t>
+            </a:r>
+            <a:br>
+              <a:rPr lang="en-CA" b="1" dirty="0"/>
+            </a:br>
+            <a:r>
+              <a:rPr lang="en-CA" b="1" dirty="0"/>
+              <a:t>	</a:t>
+            </a:r>
+            <a:r>
+              <a:rPr lang="en-CA" b="1" dirty="0" err="1"/>
+              <a:t>rddlprost</a:t>
+            </a:r>
+            <a:r>
+              <a:rPr lang="en-CA" b="1" dirty="0"/>
+              <a:t> </a:t>
+            </a:r>
+            <a:r>
+              <a:rPr lang="en-CA" b="1" dirty="0" err="1"/>
+              <a:t>domain.rddl</a:t>
+            </a:r>
+            <a:r>
+              <a:rPr lang="en-CA" b="1" dirty="0"/>
+              <a:t> </a:t>
+            </a:r>
+            <a:r>
+              <a:rPr lang="en-CA" b="1" dirty="0" err="1"/>
+              <a:t>instance.rddl</a:t>
+            </a:r>
+            <a:r>
+              <a:rPr lang="en-CA" b="1" dirty="0"/>
+              <a:t> 1 10</a:t>
+            </a:r>
+            <a:br>
+              <a:rPr lang="en-CA" b="1" dirty="0"/>
+            </a:br>
+            <a:endParaRPr lang="en-CA" b="1" dirty="0"/>
+          </a:p>
+          <a:p>
+            <a:pPr marL="514350" indent="-514350">
+              <a:buFont typeface="+mj-lt"/>
+              <a:buAutoNum type="arabicPeriod"/>
+            </a:pPr>
+            <a:r>
+              <a:rPr lang="en-CA" dirty="0"/>
+              <a:t>Check the </a:t>
+            </a:r>
+            <a:r>
+              <a:rPr lang="en-CA" dirty="0" err="1"/>
+              <a:t>data.json</a:t>
+            </a:r>
+            <a:r>
+              <a:rPr lang="en-CA" dirty="0"/>
+              <a:t>:</a:t>
+            </a:r>
+            <a:br>
+              <a:rPr lang="en-CA" dirty="0"/>
+            </a:br>
+            <a:br>
+              <a:rPr lang="en-CA" dirty="0"/>
+            </a:br>
+            <a:r>
+              <a:rPr lang="en-CA" dirty="0"/>
+              <a:t>	</a:t>
+            </a:r>
+            <a:r>
+              <a:rPr lang="en-CA" b="1" dirty="0"/>
+              <a:t>python viz.py </a:t>
+            </a:r>
+            <a:r>
+              <a:rPr lang="en-CA" b="1" dirty="0" err="1"/>
+              <a:t>data.json</a:t>
+            </a:r>
+            <a:endParaRPr lang="en-CA" dirty="0"/>
+          </a:p>
+        </p:txBody>
+      </p:sp>
     </p:spTree>
     <p:extLst>
       <p:ext uri="{BB962C8B-B14F-4D97-AF65-F5344CB8AC3E}">
@@ -10295,10 +10437,103 @@
           <a:chExt cx="0" cy="0"/>
         </a:xfrm>
       </p:grpSpPr>
+      <p:sp>
+        <p:nvSpPr>
+          <p:cNvPr id="4" name="Title 3">
+            <a:extLst>
+              <a:ext uri="{FF2B5EF4-FFF2-40B4-BE49-F238E27FC236}">
+                <a16:creationId xmlns:a16="http://schemas.microsoft.com/office/drawing/2014/main" id="{80EAC0C6-7B8A-1444-CF6E-AFD7613F9128}"/>
+              </a:ext>
+            </a:extLst>
+          </p:cNvPr>
+          <p:cNvSpPr>
+            <a:spLocks noGrp="1"/>
+          </p:cNvSpPr>
+          <p:nvPr>
+            <p:ph type="title"/>
+          </p:nvPr>
+        </p:nvSpPr>
+        <p:spPr/>
+        <p:txBody>
+          <a:bodyPr/>
+          <a:lstStyle/>
+          <a:p>
+            <a:r>
+              <a:rPr lang="en-CA" dirty="0"/>
+              <a:t>2. </a:t>
+            </a:r>
+            <a:r>
+              <a:rPr lang="en-US" dirty="0"/>
+              <a:t>Fire out when no fuel</a:t>
+            </a:r>
+            <a:endParaRPr lang="en-CA" dirty="0"/>
+          </a:p>
+        </p:txBody>
+      </p:sp>
+      <p:sp>
+        <p:nvSpPr>
+          <p:cNvPr id="5" name="Content Placeholder 4">
+            <a:extLst>
+              <a:ext uri="{FF2B5EF4-FFF2-40B4-BE49-F238E27FC236}">
+                <a16:creationId xmlns:a16="http://schemas.microsoft.com/office/drawing/2014/main" id="{916B2140-6178-6477-FAC2-4FC081B9C2C5}"/>
+              </a:ext>
+            </a:extLst>
+          </p:cNvPr>
+          <p:cNvSpPr>
+            <a:spLocks noGrp="1"/>
+          </p:cNvSpPr>
+          <p:nvPr>
+            <p:ph idx="1"/>
+          </p:nvPr>
+        </p:nvSpPr>
+        <p:spPr/>
+        <p:txBody>
+          <a:bodyPr/>
+          <a:lstStyle/>
+          <a:p>
+            <a:r>
+              <a:rPr lang="en-US" dirty="0"/>
+              <a:t>In the original, note that a fire only stops burning when it is put-out.</a:t>
+            </a:r>
+            <a:br>
+              <a:rPr lang="en-US" dirty="0"/>
+            </a:br>
+            <a:endParaRPr lang="en-US" dirty="0"/>
+          </a:p>
+          <a:p>
+            <a:r>
+              <a:rPr lang="en-US" dirty="0"/>
+              <a:t>Modify it so that a cell stops burning as soon as it is out of fuel.</a:t>
+            </a:r>
+            <a:endParaRPr lang="en-CA" dirty="0"/>
+          </a:p>
+          <a:p>
+            <a:endParaRPr lang="en-CA" dirty="0"/>
+          </a:p>
+          <a:p>
+            <a:endParaRPr lang="en-CA" dirty="0"/>
+          </a:p>
+          <a:p>
+            <a:pPr marL="0" indent="0" algn="ctr">
+              <a:buNone/>
+            </a:pPr>
+            <a:r>
+              <a:rPr lang="en-CA" sz="2800" dirty="0"/>
+              <a:t>http://editor.planning.domains/planning-course/rddl/v2</a:t>
+            </a:r>
+          </a:p>
+          <a:p>
+            <a:pPr marL="0" indent="0">
+              <a:buNone/>
+            </a:pPr>
+            <a:endParaRPr lang="en-CA" dirty="0"/>
+          </a:p>
+        </p:txBody>
+      </p:sp>
     </p:spTree>
     <p:extLst>
       <p:ext uri="{BB962C8B-B14F-4D97-AF65-F5344CB8AC3E}">
-        <p14:creationId xmlns:p14="http://schemas.microsoft.com/office/powerpoint/2010/main" val="2684736035"/>
+        <p14:creationId xmlns:p14="http://schemas.microsoft.com/office/powerpoint/2010/main" val="1445019752"/>
       </p:ext>
     </p:extLst>
   </p:cSld>
@@ -10325,16 +10560,71 @@
           <a:chExt cx="0" cy="0"/>
         </a:xfrm>
       </p:grpSpPr>
+      <p:sp>
+        <p:nvSpPr>
+          <p:cNvPr id="5" name="Content Placeholder 4">
+            <a:extLst>
+              <a:ext uri="{FF2B5EF4-FFF2-40B4-BE49-F238E27FC236}">
+                <a16:creationId xmlns:a16="http://schemas.microsoft.com/office/drawing/2014/main" id="{916B2140-6178-6477-FAC2-4FC081B9C2C5}"/>
+              </a:ext>
+            </a:extLst>
+          </p:cNvPr>
+          <p:cNvSpPr>
+            <a:spLocks noGrp="1"/>
+          </p:cNvSpPr>
+          <p:nvPr>
+            <p:ph idx="1"/>
+          </p:nvPr>
+        </p:nvSpPr>
+        <p:spPr/>
+        <p:txBody>
+          <a:bodyPr/>
+          <a:lstStyle/>
+          <a:p>
+            <a:pPr marL="0" indent="0">
+              <a:buNone/>
+            </a:pPr>
+            <a:endParaRPr lang="en-CA" dirty="0"/>
+          </a:p>
+          <a:p>
+            <a:endParaRPr lang="en-CA" dirty="0"/>
+          </a:p>
+          <a:p>
+            <a:endParaRPr lang="en-CA" dirty="0"/>
+          </a:p>
+          <a:p>
+            <a:pPr marL="0" indent="0" algn="ctr">
+              <a:buNone/>
+            </a:pPr>
+            <a:r>
+              <a:rPr lang="en-CA" sz="2800" dirty="0"/>
+              <a:t>http://editor.planning.domains/planning-course/rddl/v2fin</a:t>
+            </a:r>
+          </a:p>
+        </p:txBody>
+      </p:sp>
     </p:spTree>
     <p:extLst>
       <p:ext uri="{BB962C8B-B14F-4D97-AF65-F5344CB8AC3E}">
-        <p14:creationId xmlns:p14="http://schemas.microsoft.com/office/powerpoint/2010/main" val="2472729851"/>
+        <p14:creationId xmlns:p14="http://schemas.microsoft.com/office/powerpoint/2010/main" val="3108447499"/>
       </p:ext>
     </p:extLst>
   </p:cSld>
   <p:clrMapOvr>
     <a:masterClrMapping/>
   </p:clrMapOvr>
+  <mc:AlternateContent xmlns:mc="http://schemas.openxmlformats.org/markup-compatibility/2006" xmlns:p14="http://schemas.microsoft.com/office/powerpoint/2010/main">
+    <mc:Choice Requires="p14">
+      <p:transition spd="med" p14:dur="700">
+        <p:fade/>
+      </p:transition>
+    </mc:Choice>
+    <mc:Fallback xmlns="">
+      <p:transition spd="med">
+        <p:fade/>
+      </p:transition>
+    </mc:Fallback>
+  </mc:AlternateContent>
 </p:sld>
 </file>
 
@@ -10378,13 +10668,8 @@
           <a:p>
             <a:r>
               <a:rPr lang="en-CA" dirty="0"/>
-              <a:t>2. </a:t>
-            </a:r>
-            <a:r>
-              <a:rPr lang="en-US" dirty="0"/>
-              <a:t>Getting everyone to their destination</a:t>
-            </a:r>
-            <a:endParaRPr lang="en-CA" dirty="0"/>
+              <a:t>3. Extra Column of Forest</a:t>
+            </a:r>
           </a:p>
         </p:txBody>
       </p:sp>
@@ -10404,15 +10689,49 @@
             <p:ph idx="1"/>
           </p:nvPr>
         </p:nvSpPr>
-        <p:spPr/>
+        <p:spPr>
+          <a:xfrm>
+            <a:off x="838200" y="1825626"/>
+            <a:ext cx="10515600" cy="3791403"/>
+          </a:xfrm>
+        </p:spPr>
         <p:txBody>
-          <a:bodyPr/>
+          <a:bodyPr>
+            <a:normAutofit fontScale="92500" lnSpcReduction="10000"/>
+          </a:bodyPr>
           <a:lstStyle/>
           <a:p>
             <a:r>
-              <a:rPr lang="en-CA" dirty="0"/>
-              <a:t>Load and drive passengers and get them all there</a:t>
-            </a:r>
+              <a:rPr lang="en-US" dirty="0"/>
+              <a:t>Originally, there are 3 x positions and 3 y positions for a total of 9 cells</a:t>
+            </a:r>
+          </a:p>
+          <a:p>
+            <a:endParaRPr lang="en-US" dirty="0"/>
+          </a:p>
+          <a:p>
+            <a:r>
+              <a:rPr lang="en-US" dirty="0"/>
+              <a:t>Modify the instance to expand with an extra column </a:t>
+            </a:r>
+            <a:r>
+              <a:rPr lang="en-US" dirty="0" err="1"/>
+              <a:t>x_pos</a:t>
+            </a:r>
+            <a:r>
+              <a:rPr lang="en-US" dirty="0"/>
+              <a:t> “x4” (12 cells)</a:t>
+            </a:r>
+          </a:p>
+          <a:p>
+            <a:endParaRPr lang="en-US" dirty="0"/>
+          </a:p>
+          <a:p>
+            <a:r>
+              <a:rPr lang="en-US" dirty="0"/>
+              <a:t>However, connect only horizontally (no vertical edges), and bidirectional</a:t>
+            </a:r>
+            <a:endParaRPr lang="en-CA" dirty="0"/>
           </a:p>
           <a:p>
             <a:endParaRPr lang="en-CA" dirty="0"/>
@@ -10426,13 +10745,8 @@
             </a:pPr>
             <a:r>
               <a:rPr lang="en-CA" sz="2800" dirty="0"/>
-              <a:t>http://editor.planning.domains/planning-course/adl/passengers</a:t>
-            </a:r>
-          </a:p>
-          <a:p>
-            <a:pPr marL="0" indent="0">
-              <a:buNone/>
-            </a:pPr>
+              <a:t>http://editor.planning.domains/planning-course/rddl/v3</a:t>
+            </a:r>
             <a:endParaRPr lang="en-CA" dirty="0"/>
           </a:p>
         </p:txBody>
@@ -10440,7 +10754,7 @@
     </p:spTree>
     <p:extLst>
       <p:ext uri="{BB962C8B-B14F-4D97-AF65-F5344CB8AC3E}">
-        <p14:creationId xmlns:p14="http://schemas.microsoft.com/office/powerpoint/2010/main" val="1445019752"/>
+        <p14:creationId xmlns:p14="http://schemas.microsoft.com/office/powerpoint/2010/main" val="2049898440"/>
       </p:ext>
     </p:extLst>
   </p:cSld>
@@ -10505,7 +10819,7 @@
             </a:pPr>
             <a:r>
               <a:rPr lang="en-CA" sz="2800" dirty="0"/>
-              <a:t>http://editor.planning.domains/planning-course/adl/passenged</a:t>
+              <a:t>http://editor.planning.domains/planning-course/rddl/v3nif</a:t>
             </a:r>
           </a:p>
         </p:txBody>
@@ -10513,7 +10827,7 @@
     </p:spTree>
     <p:extLst>
       <p:ext uri="{BB962C8B-B14F-4D97-AF65-F5344CB8AC3E}">
-        <p14:creationId xmlns:p14="http://schemas.microsoft.com/office/powerpoint/2010/main" val="3108447499"/>
+        <p14:creationId xmlns:p14="http://schemas.microsoft.com/office/powerpoint/2010/main" val="2437479166"/>
       </p:ext>
     </p:extLst>
   </p:cSld>
@@ -10575,11 +10889,11 @@
           <a:p>
             <a:r>
               <a:rPr lang="en-CA" dirty="0"/>
-              <a:t>3. </a:t>
-            </a:r>
-            <a:r>
-              <a:rPr lang="en-US" dirty="0"/>
-              <a:t>Moving an autonomous car around</a:t>
+              <a:t>4. </a:t>
+            </a:r>
+            <a:r>
+              <a:rPr lang="en-US"/>
+              <a:t>Longer burn</a:t>
             </a:r>
             <a:endParaRPr lang="en-CA" dirty="0"/>
           </a:p>
@@ -10608,13 +10922,55 @@
           <a:p>
             <a:r>
               <a:rPr lang="en-CA" dirty="0"/>
-              <a:t>Put the shuttles on the circuit!</a:t>
-            </a:r>
-          </a:p>
-          <a:p>
-            <a:endParaRPr lang="en-CA" dirty="0"/>
-          </a:p>
-          <a:p>
+              <a:t>So far, </a:t>
+            </a:r>
+            <a:r>
+              <a:rPr lang="en-US" dirty="0"/>
+              <a:t>a Wildfire will burn for at most two time steps (once the cell is out-of-fuel, the fire can no longer burn)</a:t>
+            </a:r>
+            <a:br>
+              <a:rPr lang="en-US" dirty="0"/>
+            </a:br>
+            <a:endParaRPr lang="en-US" dirty="0"/>
+          </a:p>
+          <a:p>
+            <a:r>
+              <a:rPr lang="en-US" dirty="0"/>
+              <a:t>Add a new fluent </a:t>
+            </a:r>
+            <a:r>
+              <a:rPr lang="en-US" b="1" dirty="0"/>
+              <a:t>almost-out-of-fuel</a:t>
+            </a:r>
+            <a:r>
+              <a:rPr lang="en-US" dirty="0"/>
+              <a:t> that allows a fire to burn for three time steps.</a:t>
+            </a:r>
+          </a:p>
+          <a:p>
+            <a:pPr lvl="1"/>
+            <a:r>
+              <a:rPr lang="en-US" dirty="0"/>
+              <a:t>I.e., a burning cell progresses to </a:t>
+            </a:r>
+            <a:r>
+              <a:rPr lang="en-US" b="1" dirty="0"/>
+              <a:t>almost-out-of-fuel</a:t>
+            </a:r>
+            <a:r>
+              <a:rPr lang="en-US" dirty="0"/>
+              <a:t> then </a:t>
+            </a:r>
+            <a:r>
+              <a:rPr lang="en-US" b="1" dirty="0"/>
+              <a:t>out-of-fuel</a:t>
+            </a:r>
+            <a:endParaRPr lang="en-CA" b="1" dirty="0"/>
+          </a:p>
+          <a:p>
+            <a:pPr marL="0" indent="0">
+              <a:buNone/>
+            </a:pPr>
             <a:endParaRPr lang="en-CA" dirty="0"/>
           </a:p>
           <a:p>
@@ -10623,7 +10979,7 @@
             </a:pPr>
             <a:r>
               <a:rPr lang="en-CA" sz="2800" dirty="0"/>
-              <a:t>http://editor.planning.domains/planning-course/adl/circuit</a:t>
+              <a:t>http://editor.planning.domains/planning-course/rddl/v4</a:t>
             </a:r>
             <a:endParaRPr lang="en-CA" dirty="0"/>
           </a:p>
@@ -10632,7 +10988,7 @@
     </p:spTree>
     <p:extLst>
       <p:ext uri="{BB962C8B-B14F-4D97-AF65-F5344CB8AC3E}">
-        <p14:creationId xmlns:p14="http://schemas.microsoft.com/office/powerpoint/2010/main" val="2049898440"/>
+        <p14:creationId xmlns:p14="http://schemas.microsoft.com/office/powerpoint/2010/main" val="2967719754"/>
       </p:ext>
     </p:extLst>
   </p:cSld>
@@ -10697,7 +11053,7 @@
             </a:pPr>
             <a:r>
               <a:rPr lang="en-CA" sz="2800" dirty="0"/>
-              <a:t>http://editor.planning.domains/planning-course/adl/circed</a:t>
+              <a:t>http://editor.planning.domains/planning-course/rddl/v4ed</a:t>
             </a:r>
           </a:p>
         </p:txBody>
@@ -10705,7 +11061,7 @@
     </p:spTree>
     <p:extLst>
       <p:ext uri="{BB962C8B-B14F-4D97-AF65-F5344CB8AC3E}">
-        <p14:creationId xmlns:p14="http://schemas.microsoft.com/office/powerpoint/2010/main" val="2437479166"/>
+        <p14:creationId xmlns:p14="http://schemas.microsoft.com/office/powerpoint/2010/main" val="646542654"/>
       </p:ext>
     </p:extLst>
   </p:cSld>
@@ -10767,11 +11123,11 @@
           <a:p>
             <a:r>
               <a:rPr lang="en-CA" dirty="0"/>
-              <a:t>4. </a:t>
+              <a:t>5. </a:t>
             </a:r>
             <a:r>
               <a:rPr lang="en-US" dirty="0"/>
-              <a:t>Picking up / dropping off passengers</a:t>
+              <a:t>Water drop</a:t>
             </a:r>
             <a:endParaRPr lang="en-CA" dirty="0"/>
           </a:p>
@@ -10795,15 +11151,54 @@
         </p:nvSpPr>
         <p:spPr/>
         <p:txBody>
-          <a:bodyPr/>
+          <a:bodyPr>
+            <a:normAutofit fontScale="92500"/>
+          </a:bodyPr>
           <a:lstStyle/>
           <a:p>
             <a:r>
-              <a:rPr lang="en-CA" dirty="0"/>
-              <a:t>Everyone aboard! Either that, or get outa here…</a:t>
-            </a:r>
-          </a:p>
-          <a:p>
+              <a:rPr lang="en-US" dirty="0"/>
+              <a:t>So far, the domain only allows two actions: </a:t>
+            </a:r>
+            <a:r>
+              <a:rPr lang="en-US" b="1" dirty="0"/>
+              <a:t>put-out</a:t>
+            </a:r>
+            <a:r>
+              <a:rPr lang="en-US" dirty="0"/>
+              <a:t> and </a:t>
+            </a:r>
+            <a:r>
+              <a:rPr lang="en-US" b="1" dirty="0"/>
+              <a:t>cut-out</a:t>
+            </a:r>
+            <a:br>
+              <a:rPr lang="en-US" b="1" dirty="0"/>
+            </a:br>
+            <a:endParaRPr lang="en-US" b="1" dirty="0"/>
+          </a:p>
+          <a:p>
+            <a:r>
+              <a:rPr lang="en-US" dirty="0"/>
+              <a:t>Add a third action to allow a single aerial water drop which has high cost and puts out a fire in all cells neighboring where the water is dropped.</a:t>
+            </a:r>
+          </a:p>
+          <a:p>
+            <a:endParaRPr lang="en-US" dirty="0"/>
+          </a:p>
+          <a:p>
+            <a:r>
+              <a:rPr lang="en-US" dirty="0"/>
+              <a:t>Note that this change requires addition of an action fluent and changes to the </a:t>
+            </a:r>
+            <a:r>
+              <a:rPr lang="en-US" dirty="0" err="1"/>
+              <a:t>cpfs</a:t>
+            </a:r>
+            <a:r>
+              <a:rPr lang="en-US" dirty="0"/>
+              <a:t>, rewards, and state-action-constraints (max of one drop).</a:t>
+            </a:r>
             <a:endParaRPr lang="en-CA" dirty="0"/>
           </a:p>
           <a:p>
@@ -10815,7 +11210,7 @@
             </a:pPr>
             <a:r>
               <a:rPr lang="en-CA" sz="2800" dirty="0"/>
-              <a:t>http://editor.planning.domains/planning-course/adl/all-aboard</a:t>
+              <a:t>http://editor.planning.domains/planning-course/rddl/v5</a:t>
             </a:r>
             <a:endParaRPr lang="en-CA" dirty="0"/>
           </a:p>
@@ -10824,7 +11219,7 @@
     </p:spTree>
     <p:extLst>
       <p:ext uri="{BB962C8B-B14F-4D97-AF65-F5344CB8AC3E}">
-        <p14:creationId xmlns:p14="http://schemas.microsoft.com/office/powerpoint/2010/main" val="2967719754"/>
+        <p14:creationId xmlns:p14="http://schemas.microsoft.com/office/powerpoint/2010/main" val="2852421980"/>
       </p:ext>
     </p:extLst>
   </p:cSld>
@@ -10971,199 +11366,7 @@
             </a:pPr>
             <a:r>
               <a:rPr lang="en-CA" sz="2800" dirty="0"/>
-              <a:t>http://editor.planning.domains/planning-course/adl/boarded</a:t>
-            </a:r>
-          </a:p>
-        </p:txBody>
-      </p:sp>
-    </p:spTree>
-    <p:extLst>
-      <p:ext uri="{BB962C8B-B14F-4D97-AF65-F5344CB8AC3E}">
-        <p14:creationId xmlns:p14="http://schemas.microsoft.com/office/powerpoint/2010/main" val="646542654"/>
-      </p:ext>
-    </p:extLst>
-  </p:cSld>
-  <p:clrMapOvr>
-    <a:masterClrMapping/>
-  </p:clrMapOvr>
-  <mc:AlternateContent xmlns:mc="http://schemas.openxmlformats.org/markup-compatibility/2006" xmlns:p14="http://schemas.microsoft.com/office/powerpoint/2010/main">
-    <mc:Choice Requires="p14">
-      <p:transition spd="med" p14:dur="700">
-        <p:fade/>
-      </p:transition>
-    </mc:Choice>
-    <mc:Fallback xmlns="">
-      <p:transition spd="med">
-        <p:fade/>
-      </p:transition>
-    </mc:Fallback>
-  </mc:AlternateContent>
-</p:sld>
-</file>
-
-<file path=ppt/slides/slide31.xml><?xml version="1.0" encoding="utf-8"?>
-<p:sld xmlns:a="http://schemas.openxmlformats.org/drawingml/2006/main" xmlns:r="http://schemas.openxmlformats.org/officeDocument/2006/relationships" xmlns:p="http://schemas.openxmlformats.org/presentationml/2006/main" showMasterSp="0">
-  <p:cSld>
-    <p:spTree>
-      <p:nvGrpSpPr>
-        <p:cNvPr id="1" name=""/>
-        <p:cNvGrpSpPr/>
-        <p:nvPr/>
-      </p:nvGrpSpPr>
-      <p:grpSpPr>
-        <a:xfrm>
-          <a:off x="0" y="0"/>
-          <a:ext cx="0" cy="0"/>
-          <a:chOff x="0" y="0"/>
-          <a:chExt cx="0" cy="0"/>
-        </a:xfrm>
-      </p:grpSpPr>
-      <p:sp>
-        <p:nvSpPr>
-          <p:cNvPr id="4" name="Title 3">
-            <a:extLst>
-              <a:ext uri="{FF2B5EF4-FFF2-40B4-BE49-F238E27FC236}">
-                <a16:creationId xmlns:a16="http://schemas.microsoft.com/office/drawing/2014/main" id="{80EAC0C6-7B8A-1444-CF6E-AFD7613F9128}"/>
-              </a:ext>
-            </a:extLst>
-          </p:cNvPr>
-          <p:cNvSpPr>
-            <a:spLocks noGrp="1"/>
-          </p:cNvSpPr>
-          <p:nvPr>
-            <p:ph type="title"/>
-          </p:nvPr>
-        </p:nvSpPr>
-        <p:spPr/>
-        <p:txBody>
-          <a:bodyPr/>
-          <a:lstStyle/>
-          <a:p>
-            <a:r>
-              <a:rPr lang="en-CA" dirty="0"/>
-              <a:t>5. </a:t>
-            </a:r>
-            <a:r>
-              <a:rPr lang="en-US" dirty="0"/>
-              <a:t>Safe manual moves</a:t>
-            </a:r>
-            <a:endParaRPr lang="en-CA" dirty="0"/>
-          </a:p>
-        </p:txBody>
-      </p:sp>
-      <p:sp>
-        <p:nvSpPr>
-          <p:cNvPr id="5" name="Content Placeholder 4">
-            <a:extLst>
-              <a:ext uri="{FF2B5EF4-FFF2-40B4-BE49-F238E27FC236}">
-                <a16:creationId xmlns:a16="http://schemas.microsoft.com/office/drawing/2014/main" id="{916B2140-6178-6477-FAC2-4FC081B9C2C5}"/>
-              </a:ext>
-            </a:extLst>
-          </p:cNvPr>
-          <p:cNvSpPr>
-            <a:spLocks noGrp="1"/>
-          </p:cNvSpPr>
-          <p:nvPr>
-            <p:ph idx="1"/>
-          </p:nvPr>
-        </p:nvSpPr>
-        <p:spPr/>
-        <p:txBody>
-          <a:bodyPr/>
-          <a:lstStyle/>
-          <a:p>
-            <a:r>
-              <a:rPr lang="en-CA" dirty="0"/>
-              <a:t>Let’s just avoid all those Tesla shuttles…</a:t>
-            </a:r>
-          </a:p>
-          <a:p>
-            <a:endParaRPr lang="en-CA" dirty="0"/>
-          </a:p>
-          <a:p>
-            <a:endParaRPr lang="en-CA" dirty="0"/>
-          </a:p>
-          <a:p>
-            <a:pPr marL="0" indent="0" algn="ctr">
-              <a:buNone/>
-            </a:pPr>
-            <a:r>
-              <a:rPr lang="en-CA" sz="2800" dirty="0"/>
-              <a:t>http://editor.planning.domains/planning-course/adl/safe</a:t>
-            </a:r>
-            <a:endParaRPr lang="en-CA" dirty="0"/>
-          </a:p>
-        </p:txBody>
-      </p:sp>
-    </p:spTree>
-    <p:extLst>
-      <p:ext uri="{BB962C8B-B14F-4D97-AF65-F5344CB8AC3E}">
-        <p14:creationId xmlns:p14="http://schemas.microsoft.com/office/powerpoint/2010/main" val="2852421980"/>
-      </p:ext>
-    </p:extLst>
-  </p:cSld>
-  <p:clrMapOvr>
-    <a:masterClrMapping/>
-  </p:clrMapOvr>
-</p:sld>
-</file>
-
-<file path=ppt/slides/slide32.xml><?xml version="1.0" encoding="utf-8"?>
-<p:sld xmlns:a="http://schemas.openxmlformats.org/drawingml/2006/main" xmlns:r="http://schemas.openxmlformats.org/officeDocument/2006/relationships" xmlns:p="http://schemas.openxmlformats.org/presentationml/2006/main" showMasterSp="0">
-  <p:cSld>
-    <p:spTree>
-      <p:nvGrpSpPr>
-        <p:cNvPr id="1" name=""/>
-        <p:cNvGrpSpPr/>
-        <p:nvPr/>
-      </p:nvGrpSpPr>
-      <p:grpSpPr>
-        <a:xfrm>
-          <a:off x="0" y="0"/>
-          <a:ext cx="0" cy="0"/>
-          <a:chOff x="0" y="0"/>
-          <a:chExt cx="0" cy="0"/>
-        </a:xfrm>
-      </p:grpSpPr>
-      <p:sp>
-        <p:nvSpPr>
-          <p:cNvPr id="5" name="Content Placeholder 4">
-            <a:extLst>
-              <a:ext uri="{FF2B5EF4-FFF2-40B4-BE49-F238E27FC236}">
-                <a16:creationId xmlns:a16="http://schemas.microsoft.com/office/drawing/2014/main" id="{916B2140-6178-6477-FAC2-4FC081B9C2C5}"/>
-              </a:ext>
-            </a:extLst>
-          </p:cNvPr>
-          <p:cNvSpPr>
-            <a:spLocks noGrp="1"/>
-          </p:cNvSpPr>
-          <p:nvPr>
-            <p:ph idx="1"/>
-          </p:nvPr>
-        </p:nvSpPr>
-        <p:spPr/>
-        <p:txBody>
-          <a:bodyPr/>
-          <a:lstStyle/>
-          <a:p>
-            <a:pPr marL="0" indent="0">
-              <a:buNone/>
-            </a:pPr>
-            <a:endParaRPr lang="en-CA" dirty="0"/>
-          </a:p>
-          <a:p>
-            <a:endParaRPr lang="en-CA" dirty="0"/>
-          </a:p>
-          <a:p>
-            <a:endParaRPr lang="en-CA" dirty="0"/>
-          </a:p>
-          <a:p>
-            <a:pPr marL="0" indent="0" algn="ctr">
-              <a:buNone/>
-            </a:pPr>
-            <a:r>
-              <a:rPr lang="en-CA" sz="2800" dirty="0"/>
-              <a:t>http://editor.planning.domains/planning-course/adl/safetied</a:t>
+              <a:t>http://editor.planning.domains/planning-course/rddl/v5set</a:t>
             </a:r>
           </a:p>
         </p:txBody>
@@ -11193,7 +11396,7 @@
 </p:sld>
 </file>
 
-<file path=ppt/slides/slide33.xml><?xml version="1.0" encoding="utf-8"?>
+<file path=ppt/slides/slide31.xml><?xml version="1.0" encoding="utf-8"?>
 <p:sld xmlns:a="http://schemas.openxmlformats.org/drawingml/2006/main" xmlns:r="http://schemas.openxmlformats.org/officeDocument/2006/relationships" xmlns:p="http://schemas.openxmlformats.org/presentationml/2006/main" showMasterSp="0">
   <p:cSld>
     <p:spTree>

</xml_diff>

<commit_message>
Tried (and successfully) played with rdd l encodings and updated slide gotchas.
</commit_message>
<xml_diff>
--- a/exercises/cisc-813/rddl/slides.pptx
+++ b/exercises/cisc-813/rddl/slides.pptx
@@ -10,32 +10,33 @@
     <p:sldId id="1690" r:id="rId4"/>
     <p:sldId id="257" r:id="rId5"/>
     <p:sldId id="1723" r:id="rId6"/>
-    <p:sldId id="261" r:id="rId7"/>
-    <p:sldId id="1705" r:id="rId8"/>
-    <p:sldId id="1694" r:id="rId9"/>
-    <p:sldId id="1706" r:id="rId10"/>
-    <p:sldId id="1707" r:id="rId11"/>
-    <p:sldId id="1708" r:id="rId12"/>
-    <p:sldId id="1715" r:id="rId13"/>
-    <p:sldId id="1716" r:id="rId14"/>
-    <p:sldId id="1717" r:id="rId15"/>
-    <p:sldId id="1712" r:id="rId16"/>
-    <p:sldId id="1713" r:id="rId17"/>
-    <p:sldId id="1714" r:id="rId18"/>
-    <p:sldId id="1711" r:id="rId19"/>
-    <p:sldId id="1709" r:id="rId20"/>
-    <p:sldId id="1718" r:id="rId21"/>
-    <p:sldId id="1719" r:id="rId22"/>
-    <p:sldId id="1720" r:id="rId23"/>
-    <p:sldId id="1695" r:id="rId24"/>
-    <p:sldId id="1701" r:id="rId25"/>
-    <p:sldId id="1696" r:id="rId26"/>
-    <p:sldId id="1702" r:id="rId27"/>
-    <p:sldId id="1697" r:id="rId28"/>
-    <p:sldId id="1703" r:id="rId29"/>
-    <p:sldId id="1698" r:id="rId30"/>
-    <p:sldId id="1704" r:id="rId31"/>
-    <p:sldId id="1684" r:id="rId32"/>
+    <p:sldId id="1724" r:id="rId7"/>
+    <p:sldId id="261" r:id="rId8"/>
+    <p:sldId id="1705" r:id="rId9"/>
+    <p:sldId id="1694" r:id="rId10"/>
+    <p:sldId id="1706" r:id="rId11"/>
+    <p:sldId id="1707" r:id="rId12"/>
+    <p:sldId id="1708" r:id="rId13"/>
+    <p:sldId id="1715" r:id="rId14"/>
+    <p:sldId id="1716" r:id="rId15"/>
+    <p:sldId id="1717" r:id="rId16"/>
+    <p:sldId id="1712" r:id="rId17"/>
+    <p:sldId id="1713" r:id="rId18"/>
+    <p:sldId id="1714" r:id="rId19"/>
+    <p:sldId id="1711" r:id="rId20"/>
+    <p:sldId id="1709" r:id="rId21"/>
+    <p:sldId id="1718" r:id="rId22"/>
+    <p:sldId id="1719" r:id="rId23"/>
+    <p:sldId id="1720" r:id="rId24"/>
+    <p:sldId id="1695" r:id="rId25"/>
+    <p:sldId id="1701" r:id="rId26"/>
+    <p:sldId id="1696" r:id="rId27"/>
+    <p:sldId id="1702" r:id="rId28"/>
+    <p:sldId id="1697" r:id="rId29"/>
+    <p:sldId id="1703" r:id="rId30"/>
+    <p:sldId id="1698" r:id="rId31"/>
+    <p:sldId id="1704" r:id="rId32"/>
+    <p:sldId id="1684" r:id="rId33"/>
   </p:sldIdLst>
   <p:sldSz cx="12192000" cy="6858000"/>
   <p:notesSz cx="6858000" cy="9144000"/>
@@ -708,7 +709,7 @@
           <a:p>
             <a:fld id="{D6D0F569-AC90-44EB-9EF4-4E5C2F5D823C}" type="datetime1">
               <a:rPr lang="en-US" smtClean="0"/>
-              <a:t>1/8/2023</a:t>
+              <a:t>1/9/2023</a:t>
             </a:fld>
             <a:endParaRPr lang="en-US" dirty="0"/>
           </a:p>
@@ -1387,7 +1388,7 @@
           <a:p>
             <a:fld id="{46BA7D41-E8B7-4A0B-B861-3EC4AE88917D}" type="datetime1">
               <a:rPr lang="en-US" smtClean="0"/>
-              <a:t>1/8/2023</a:t>
+              <a:t>1/9/2023</a:t>
             </a:fld>
             <a:endParaRPr lang="en-US" dirty="0"/>
           </a:p>
@@ -2076,7 +2077,7 @@
           <a:p>
             <a:fld id="{A7C34823-0B19-4B4E-A643-7A3B0A3D24D6}" type="datetime1">
               <a:rPr lang="en-US" smtClean="0"/>
-              <a:t>1/8/2023</a:t>
+              <a:t>1/9/2023</a:t>
             </a:fld>
             <a:endParaRPr lang="en-US" dirty="0"/>
           </a:p>
@@ -3199,7 +3200,7 @@
           <a:p>
             <a:fld id="{8C2D79EF-17C8-45D8-9866-DAF5723FC604}" type="datetime1">
               <a:rPr lang="en-US" smtClean="0"/>
-              <a:t>1/8/2023</a:t>
+              <a:t>1/9/2023</a:t>
             </a:fld>
             <a:endParaRPr lang="en-US" dirty="0"/>
           </a:p>
@@ -3954,7 +3955,7 @@
           <a:p>
             <a:fld id="{DFFC2ADC-3680-4013-A757-E4663495DB98}" type="datetime1">
               <a:rPr lang="en-US" smtClean="0"/>
-              <a:t>1/8/2023</a:t>
+              <a:t>1/9/2023</a:t>
             </a:fld>
             <a:endParaRPr lang="en-US" dirty="0"/>
           </a:p>
@@ -4701,7 +4702,7 @@
           <a:p>
             <a:fld id="{4751BA94-5DCA-4F19-960F-0FB2BD5EE85A}" type="datetime1">
               <a:rPr lang="en-US" smtClean="0"/>
-              <a:t>1/8/2023</a:t>
+              <a:t>1/9/2023</a:t>
             </a:fld>
             <a:endParaRPr lang="en-US" dirty="0"/>
           </a:p>
@@ -5595,7 +5596,7 @@
           <a:p>
             <a:fld id="{01BED947-38D9-44AC-8B89-E79758333B77}" type="datetime1">
               <a:rPr lang="en-US" smtClean="0"/>
-              <a:t>1/8/2023</a:t>
+              <a:t>1/9/2023</a:t>
             </a:fld>
             <a:endParaRPr lang="en-US" dirty="0"/>
           </a:p>
@@ -6216,7 +6217,7 @@
           <a:p>
             <a:fld id="{3781E23F-BD3C-4F23-B116-2B758120C8AC}" type="datetime1">
               <a:rPr lang="en-US" smtClean="0"/>
-              <a:t>1/8/2023</a:t>
+              <a:t>1/9/2023</a:t>
             </a:fld>
             <a:endParaRPr lang="en-US" dirty="0"/>
           </a:p>
@@ -6808,7 +6809,7 @@
           <a:p>
             <a:fld id="{473CFAA9-6D59-4D98-869E-ACBDB83B2CA4}" type="datetime1">
               <a:rPr lang="en-US" smtClean="0"/>
-              <a:t>1/8/2023</a:t>
+              <a:t>1/9/2023</a:t>
             </a:fld>
             <a:endParaRPr lang="en-US"/>
           </a:p>
@@ -7600,7 +7601,7 @@
           <a:p>
             <a:fld id="{DC410804-27E3-430A-BB42-B831260DE39A}" type="datetime1">
               <a:rPr lang="en-US" smtClean="0"/>
-              <a:t>1/8/2023</a:t>
+              <a:t>1/9/2023</a:t>
             </a:fld>
             <a:endParaRPr lang="en-US" dirty="0"/>
           </a:p>
@@ -8371,7 +8372,7 @@
           <a:p>
             <a:fld id="{60E22DE3-3D1A-4D53-B9A6-6C7463B8C992}" type="datetime1">
               <a:rPr lang="en-US" smtClean="0"/>
-              <a:t>1/8/2023</a:t>
+              <a:t>1/9/2023</a:t>
             </a:fld>
             <a:endParaRPr lang="en-US" dirty="0"/>
           </a:p>
@@ -8682,7 +8683,7 @@
             <a:fld id="{5ECD8B30-1B71-45A1-8314-D59C86F581E1}" type="datetime1">
               <a:rPr lang="en-US" smtClean="0"/>
               <a:pPr/>
-              <a:t>1/8/2023</a:t>
+              <a:t>1/9/2023</a:t>
             </a:fld>
             <a:endParaRPr lang="en-US" b="1" dirty="0"/>
           </a:p>
@@ -9208,6 +9209,79 @@
       </p:grpSpPr>
       <p:pic>
         <p:nvPicPr>
+          <p:cNvPr id="7" name="Picture 6">
+            <a:extLst>
+              <a:ext uri="{FF2B5EF4-FFF2-40B4-BE49-F238E27FC236}">
+                <a16:creationId xmlns:a16="http://schemas.microsoft.com/office/drawing/2014/main" id="{D953F485-84BC-A785-4E31-90917F0BC7D6}"/>
+              </a:ext>
+            </a:extLst>
+          </p:cNvPr>
+          <p:cNvPicPr>
+            <a:picLocks noChangeAspect="1"/>
+          </p:cNvPicPr>
+          <p:nvPr/>
+        </p:nvPicPr>
+        <p:blipFill>
+          <a:blip r:embed="rId2"/>
+          <a:stretch>
+            <a:fillRect/>
+          </a:stretch>
+        </p:blipFill>
+        <p:spPr>
+          <a:xfrm>
+            <a:off x="3423864" y="1357023"/>
+            <a:ext cx="5344271" cy="4143953"/>
+          </a:xfrm>
+          <a:prstGeom prst="roundRect">
+            <a:avLst>
+              <a:gd name="adj" fmla="val 8594"/>
+            </a:avLst>
+          </a:prstGeom>
+          <a:solidFill>
+            <a:srgbClr val="FFFFFF">
+              <a:shade val="85000"/>
+            </a:srgbClr>
+          </a:solidFill>
+          <a:ln>
+            <a:noFill/>
+          </a:ln>
+          <a:effectLst>
+            <a:reflection blurRad="12700" stA="38000" endPos="28000" dist="5000" dir="5400000" sy="-100000" algn="bl" rotWithShape="0"/>
+          </a:effectLst>
+        </p:spPr>
+      </p:pic>
+    </p:spTree>
+    <p:extLst>
+      <p:ext uri="{BB962C8B-B14F-4D97-AF65-F5344CB8AC3E}">
+        <p14:creationId xmlns:p14="http://schemas.microsoft.com/office/powerpoint/2010/main" val="2842933087"/>
+      </p:ext>
+    </p:extLst>
+  </p:cSld>
+  <p:clrMapOvr>
+    <a:masterClrMapping/>
+  </p:clrMapOvr>
+</p:sld>
+</file>
+
+<file path=ppt/slides/slide11.xml><?xml version="1.0" encoding="utf-8"?>
+<p:sld xmlns:a="http://schemas.openxmlformats.org/drawingml/2006/main" xmlns:r="http://schemas.openxmlformats.org/officeDocument/2006/relationships" xmlns:p="http://schemas.openxmlformats.org/presentationml/2006/main" showMasterSp="0">
+  <p:cSld>
+    <p:spTree>
+      <p:nvGrpSpPr>
+        <p:cNvPr id="1" name=""/>
+        <p:cNvGrpSpPr/>
+        <p:nvPr/>
+      </p:nvGrpSpPr>
+      <p:grpSpPr>
+        <a:xfrm>
+          <a:off x="0" y="0"/>
+          <a:ext cx="0" cy="0"/>
+          <a:chOff x="0" y="0"/>
+          <a:chExt cx="0" cy="0"/>
+        </a:xfrm>
+      </p:grpSpPr>
+      <p:pic>
+        <p:nvPicPr>
           <p:cNvPr id="3" name="Picture 2">
             <a:extLst>
               <a:ext uri="{FF2B5EF4-FFF2-40B4-BE49-F238E27FC236}">
@@ -9262,7 +9336,7 @@
 </p:sld>
 </file>
 
-<file path=ppt/slides/slide11.xml><?xml version="1.0" encoding="utf-8"?>
+<file path=ppt/slides/slide12.xml><?xml version="1.0" encoding="utf-8"?>
 <p:sld xmlns:a="http://schemas.openxmlformats.org/drawingml/2006/main" xmlns:r="http://schemas.openxmlformats.org/officeDocument/2006/relationships" xmlns:p="http://schemas.openxmlformats.org/presentationml/2006/main" showMasterSp="0">
   <p:cSld>
     <p:spTree>
@@ -9335,7 +9409,7 @@
 </p:sld>
 </file>
 
-<file path=ppt/slides/slide12.xml><?xml version="1.0" encoding="utf-8"?>
+<file path=ppt/slides/slide13.xml><?xml version="1.0" encoding="utf-8"?>
 <p:sld xmlns:a="http://schemas.openxmlformats.org/drawingml/2006/main" xmlns:r="http://schemas.openxmlformats.org/officeDocument/2006/relationships" xmlns:p="http://schemas.openxmlformats.org/presentationml/2006/main" showMasterSp="0">
   <p:cSld>
     <p:spTree>
@@ -9408,7 +9482,7 @@
 </p:sld>
 </file>
 
-<file path=ppt/slides/slide13.xml><?xml version="1.0" encoding="utf-8"?>
+<file path=ppt/slides/slide14.xml><?xml version="1.0" encoding="utf-8"?>
 <p:sld xmlns:a="http://schemas.openxmlformats.org/drawingml/2006/main" xmlns:r="http://schemas.openxmlformats.org/officeDocument/2006/relationships" xmlns:p="http://schemas.openxmlformats.org/presentationml/2006/main" showMasterSp="0">
   <p:cSld>
     <p:spTree>
@@ -9481,7 +9555,7 @@
 </p:sld>
 </file>
 
-<file path=ppt/slides/slide14.xml><?xml version="1.0" encoding="utf-8"?>
+<file path=ppt/slides/slide15.xml><?xml version="1.0" encoding="utf-8"?>
 <p:sld xmlns:a="http://schemas.openxmlformats.org/drawingml/2006/main" xmlns:r="http://schemas.openxmlformats.org/officeDocument/2006/relationships" xmlns:p="http://schemas.openxmlformats.org/presentationml/2006/main" showMasterSp="0">
   <p:cSld>
     <p:spTree>
@@ -9563,7 +9637,7 @@
 </p:sld>
 </file>
 
-<file path=ppt/slides/slide15.xml><?xml version="1.0" encoding="utf-8"?>
+<file path=ppt/slides/slide16.xml><?xml version="1.0" encoding="utf-8"?>
 <p:sld xmlns:a="http://schemas.openxmlformats.org/drawingml/2006/main" xmlns:r="http://schemas.openxmlformats.org/officeDocument/2006/relationships" xmlns:p="http://schemas.openxmlformats.org/presentationml/2006/main" showMasterSp="0">
   <p:cSld>
     <p:spTree>
@@ -9645,7 +9719,7 @@
 </p:sld>
 </file>
 
-<file path=ppt/slides/slide16.xml><?xml version="1.0" encoding="utf-8"?>
+<file path=ppt/slides/slide17.xml><?xml version="1.0" encoding="utf-8"?>
 <p:sld xmlns:a="http://schemas.openxmlformats.org/drawingml/2006/main" xmlns:r="http://schemas.openxmlformats.org/officeDocument/2006/relationships" xmlns:p="http://schemas.openxmlformats.org/presentationml/2006/main" showMasterSp="0">
   <p:cSld>
     <p:spTree>
@@ -9715,7 +9789,7 @@
 </p:sld>
 </file>
 
-<file path=ppt/slides/slide17.xml><?xml version="1.0" encoding="utf-8"?>
+<file path=ppt/slides/slide18.xml><?xml version="1.0" encoding="utf-8"?>
 <p:sld xmlns:a="http://schemas.openxmlformats.org/drawingml/2006/main" xmlns:r="http://schemas.openxmlformats.org/officeDocument/2006/relationships" xmlns:p="http://schemas.openxmlformats.org/presentationml/2006/main" showMasterSp="0">
   <p:cSld>
     <p:spTree>
@@ -9788,7 +9862,7 @@
 </p:sld>
 </file>
 
-<file path=ppt/slides/slide18.xml><?xml version="1.0" encoding="utf-8"?>
+<file path=ppt/slides/slide19.xml><?xml version="1.0" encoding="utf-8"?>
 <p:sld xmlns:a="http://schemas.openxmlformats.org/drawingml/2006/main" xmlns:r="http://schemas.openxmlformats.org/officeDocument/2006/relationships" xmlns:p="http://schemas.openxmlformats.org/presentationml/2006/main" showMasterSp="0">
   <p:cSld>
     <p:spTree>
@@ -9861,7 +9935,101 @@
 </p:sld>
 </file>
 
-<file path=ppt/slides/slide19.xml><?xml version="1.0" encoding="utf-8"?>
+<file path=ppt/slides/slide2.xml><?xml version="1.0" encoding="utf-8"?>
+<p:sld xmlns:a="http://schemas.openxmlformats.org/drawingml/2006/main" xmlns:r="http://schemas.openxmlformats.org/officeDocument/2006/relationships" xmlns:p="http://schemas.openxmlformats.org/presentationml/2006/main">
+  <p:cSld>
+    <p:spTree>
+      <p:nvGrpSpPr>
+        <p:cNvPr id="1" name=""/>
+        <p:cNvGrpSpPr/>
+        <p:nvPr/>
+      </p:nvGrpSpPr>
+      <p:grpSpPr>
+        <a:xfrm>
+          <a:off x="0" y="0"/>
+          <a:ext cx="0" cy="0"/>
+          <a:chOff x="0" y="0"/>
+          <a:chExt cx="0" cy="0"/>
+        </a:xfrm>
+      </p:grpSpPr>
+      <p:sp>
+        <p:nvSpPr>
+          <p:cNvPr id="171" name="http://editor.planning.domains/"/>
+          <p:cNvSpPr txBox="1">
+            <a:spLocks noGrp="1"/>
+          </p:cNvSpPr>
+          <p:nvPr>
+            <p:ph type="body" idx="21"/>
+          </p:nvPr>
+        </p:nvSpPr>
+        <p:spPr>
+          <a:xfrm>
+            <a:off x="1190625" y="2086324"/>
+            <a:ext cx="9810750" cy="2685351"/>
+          </a:xfrm>
+          <a:prstGeom prst="rect">
+            <a:avLst/>
+          </a:prstGeom>
+        </p:spPr>
+        <p:txBody>
+          <a:bodyPr/>
+          <a:lstStyle/>
+          <a:p>
+            <a:r>
+              <a:rPr lang="en-US" b="1" dirty="0"/>
+              <a:t>Recommended Editor</a:t>
+            </a:r>
+            <a:r>
+              <a:rPr lang="en-US" dirty="0"/>
+              <a:t>:</a:t>
+            </a:r>
+          </a:p>
+          <a:p>
+            <a:r>
+              <a:rPr lang="en-US" i="1" dirty="0" err="1"/>
+              <a:t>VSCode</a:t>
+            </a:r>
+            <a:r>
+              <a:rPr lang="en-US" i="1" dirty="0"/>
+              <a:t> + PDDL Plugin</a:t>
+            </a:r>
+            <a:br>
+              <a:rPr lang="en-US" i="1" dirty="0"/>
+            </a:br>
+            <a:endParaRPr lang="en-US" i="1" dirty="0"/>
+          </a:p>
+          <a:p>
+            <a:r>
+              <a:rPr lang="en-US" b="1" dirty="0"/>
+              <a:t>Recommended Planner</a:t>
+            </a:r>
+            <a:r>
+              <a:rPr lang="en-US" dirty="0"/>
+              <a:t>:</a:t>
+            </a:r>
+          </a:p>
+          <a:p>
+            <a:r>
+              <a:rPr lang="en-US" i="1" dirty="0" err="1"/>
+              <a:t>pyRDDL</a:t>
+            </a:r>
+            <a:r>
+              <a:rPr lang="en-US" i="1" dirty="0"/>
+              <a:t> + PROST</a:t>
+            </a:r>
+          </a:p>
+        </p:txBody>
+      </p:sp>
+    </p:spTree>
+  </p:cSld>
+  <p:clrMapOvr>
+    <a:masterClrMapping/>
+  </p:clrMapOvr>
+  <p:transition spd="med"/>
+</p:sld>
+</file>
+
+<file path=ppt/slides/slide20.xml><?xml version="1.0" encoding="utf-8"?>
 <p:sld xmlns:a="http://schemas.openxmlformats.org/drawingml/2006/main" xmlns:r="http://schemas.openxmlformats.org/officeDocument/2006/relationships" xmlns:p="http://schemas.openxmlformats.org/presentationml/2006/main" showMasterSp="0">
   <p:cSld>
     <p:spTree>
@@ -9934,101 +10102,7 @@
 </p:sld>
 </file>
 
-<file path=ppt/slides/slide2.xml><?xml version="1.0" encoding="utf-8"?>
-<p:sld xmlns:a="http://schemas.openxmlformats.org/drawingml/2006/main" xmlns:r="http://schemas.openxmlformats.org/officeDocument/2006/relationships" xmlns:p="http://schemas.openxmlformats.org/presentationml/2006/main">
-  <p:cSld>
-    <p:spTree>
-      <p:nvGrpSpPr>
-        <p:cNvPr id="1" name=""/>
-        <p:cNvGrpSpPr/>
-        <p:nvPr/>
-      </p:nvGrpSpPr>
-      <p:grpSpPr>
-        <a:xfrm>
-          <a:off x="0" y="0"/>
-          <a:ext cx="0" cy="0"/>
-          <a:chOff x="0" y="0"/>
-          <a:chExt cx="0" cy="0"/>
-        </a:xfrm>
-      </p:grpSpPr>
-      <p:sp>
-        <p:nvSpPr>
-          <p:cNvPr id="171" name="http://editor.planning.domains/"/>
-          <p:cNvSpPr txBox="1">
-            <a:spLocks noGrp="1"/>
-          </p:cNvSpPr>
-          <p:nvPr>
-            <p:ph type="body" idx="21"/>
-          </p:nvPr>
-        </p:nvSpPr>
-        <p:spPr>
-          <a:xfrm>
-            <a:off x="1190625" y="2086324"/>
-            <a:ext cx="9810750" cy="2685351"/>
-          </a:xfrm>
-          <a:prstGeom prst="rect">
-            <a:avLst/>
-          </a:prstGeom>
-        </p:spPr>
-        <p:txBody>
-          <a:bodyPr/>
-          <a:lstStyle/>
-          <a:p>
-            <a:r>
-              <a:rPr lang="en-US" b="1" dirty="0"/>
-              <a:t>Recommended Editor</a:t>
-            </a:r>
-            <a:r>
-              <a:rPr lang="en-US" dirty="0"/>
-              <a:t>:</a:t>
-            </a:r>
-          </a:p>
-          <a:p>
-            <a:r>
-              <a:rPr lang="en-US" i="1" dirty="0" err="1"/>
-              <a:t>VSCode</a:t>
-            </a:r>
-            <a:r>
-              <a:rPr lang="en-US" i="1" dirty="0"/>
-              <a:t> + PDDL Plugin</a:t>
-            </a:r>
-            <a:br>
-              <a:rPr lang="en-US" i="1" dirty="0"/>
-            </a:br>
-            <a:endParaRPr lang="en-US" i="1" dirty="0"/>
-          </a:p>
-          <a:p>
-            <a:r>
-              <a:rPr lang="en-US" b="1" dirty="0"/>
-              <a:t>Recommended Planner</a:t>
-            </a:r>
-            <a:r>
-              <a:rPr lang="en-US" dirty="0"/>
-              <a:t>:</a:t>
-            </a:r>
-          </a:p>
-          <a:p>
-            <a:r>
-              <a:rPr lang="en-US" i="1" dirty="0" err="1"/>
-              <a:t>pyRDDL</a:t>
-            </a:r>
-            <a:r>
-              <a:rPr lang="en-US" i="1" dirty="0"/>
-              <a:t> + PROST</a:t>
-            </a:r>
-          </a:p>
-        </p:txBody>
-      </p:sp>
-    </p:spTree>
-  </p:cSld>
-  <p:clrMapOvr>
-    <a:masterClrMapping/>
-  </p:clrMapOvr>
-  <p:transition spd="med"/>
-</p:sld>
-</file>
-
-<file path=ppt/slides/slide20.xml><?xml version="1.0" encoding="utf-8"?>
+<file path=ppt/slides/slide21.xml><?xml version="1.0" encoding="utf-8"?>
 <p:sld xmlns:a="http://schemas.openxmlformats.org/drawingml/2006/main" xmlns:r="http://schemas.openxmlformats.org/officeDocument/2006/relationships" xmlns:p="http://schemas.openxmlformats.org/presentationml/2006/main" showMasterSp="0">
   <p:cSld>
     <p:spTree>
@@ -10101,7 +10175,7 @@
 </p:sld>
 </file>
 
-<file path=ppt/slides/slide21.xml><?xml version="1.0" encoding="utf-8"?>
+<file path=ppt/slides/slide22.xml><?xml version="1.0" encoding="utf-8"?>
 <p:sld xmlns:a="http://schemas.openxmlformats.org/drawingml/2006/main" xmlns:r="http://schemas.openxmlformats.org/officeDocument/2006/relationships" xmlns:p="http://schemas.openxmlformats.org/presentationml/2006/main" showMasterSp="0">
   <p:cSld>
     <p:spTree>
@@ -10217,7 +10291,7 @@
 </p:sld>
 </file>
 
-<file path=ppt/slides/slide22.xml><?xml version="1.0" encoding="utf-8"?>
+<file path=ppt/slides/slide23.xml><?xml version="1.0" encoding="utf-8"?>
 <p:sld xmlns:a="http://schemas.openxmlformats.org/drawingml/2006/main" xmlns:r="http://schemas.openxmlformats.org/officeDocument/2006/relationships" xmlns:p="http://schemas.openxmlformats.org/presentationml/2006/main" showMasterSp="0">
   <p:cSld>
     <p:spTree>
@@ -10420,7 +10494,7 @@
 </p:sld>
 </file>
 
-<file path=ppt/slides/slide23.xml><?xml version="1.0" encoding="utf-8"?>
+<file path=ppt/slides/slide24.xml><?xml version="1.0" encoding="utf-8"?>
 <p:sld xmlns:a="http://schemas.openxmlformats.org/drawingml/2006/main" xmlns:r="http://schemas.openxmlformats.org/officeDocument/2006/relationships" xmlns:p="http://schemas.openxmlformats.org/presentationml/2006/main" showMasterSp="0">
   <p:cSld>
     <p:spTree>
@@ -10543,7 +10617,7 @@
 </p:sld>
 </file>
 
-<file path=ppt/slides/slide24.xml><?xml version="1.0" encoding="utf-8"?>
+<file path=ppt/slides/slide25.xml><?xml version="1.0" encoding="utf-8"?>
 <p:sld xmlns:a="http://schemas.openxmlformats.org/drawingml/2006/main" xmlns:r="http://schemas.openxmlformats.org/officeDocument/2006/relationships" xmlns:p="http://schemas.openxmlformats.org/presentationml/2006/main" showMasterSp="0">
   <p:cSld>
     <p:spTree>
@@ -10628,7 +10702,7 @@
 </p:sld>
 </file>
 
-<file path=ppt/slides/slide25.xml><?xml version="1.0" encoding="utf-8"?>
+<file path=ppt/slides/slide26.xml><?xml version="1.0" encoding="utf-8"?>
 <p:sld xmlns:a="http://schemas.openxmlformats.org/drawingml/2006/main" xmlns:r="http://schemas.openxmlformats.org/officeDocument/2006/relationships" xmlns:p="http://schemas.openxmlformats.org/presentationml/2006/main" showMasterSp="0">
   <p:cSld>
     <p:spTree>
@@ -10764,7 +10838,7 @@
 </p:sld>
 </file>
 
-<file path=ppt/slides/slide26.xml><?xml version="1.0" encoding="utf-8"?>
+<file path=ppt/slides/slide27.xml><?xml version="1.0" encoding="utf-8"?>
 <p:sld xmlns:a="http://schemas.openxmlformats.org/drawingml/2006/main" xmlns:r="http://schemas.openxmlformats.org/officeDocument/2006/relationships" xmlns:p="http://schemas.openxmlformats.org/presentationml/2006/main" showMasterSp="0">
   <p:cSld>
     <p:spTree>
@@ -10849,7 +10923,7 @@
 </p:sld>
 </file>
 
-<file path=ppt/slides/slide27.xml><?xml version="1.0" encoding="utf-8"?>
+<file path=ppt/slides/slide28.xml><?xml version="1.0" encoding="utf-8"?>
 <p:sld xmlns:a="http://schemas.openxmlformats.org/drawingml/2006/main" xmlns:r="http://schemas.openxmlformats.org/officeDocument/2006/relationships" xmlns:p="http://schemas.openxmlformats.org/presentationml/2006/main" showMasterSp="0">
   <p:cSld>
     <p:spTree>
@@ -10998,7 +11072,7 @@
 </p:sld>
 </file>
 
-<file path=ppt/slides/slide28.xml><?xml version="1.0" encoding="utf-8"?>
+<file path=ppt/slides/slide29.xml><?xml version="1.0" encoding="utf-8"?>
 <p:sld xmlns:a="http://schemas.openxmlformats.org/drawingml/2006/main" xmlns:r="http://schemas.openxmlformats.org/officeDocument/2006/relationships" xmlns:p="http://schemas.openxmlformats.org/presentationml/2006/main" showMasterSp="0">
   <p:cSld>
     <p:spTree>
@@ -11080,152 +11154,6 @@
       </p:transition>
     </mc:Fallback>
   </mc:AlternateContent>
-</p:sld>
-</file>
-
-<file path=ppt/slides/slide29.xml><?xml version="1.0" encoding="utf-8"?>
-<p:sld xmlns:a="http://schemas.openxmlformats.org/drawingml/2006/main" xmlns:r="http://schemas.openxmlformats.org/officeDocument/2006/relationships" xmlns:p="http://schemas.openxmlformats.org/presentationml/2006/main" showMasterSp="0">
-  <p:cSld>
-    <p:spTree>
-      <p:nvGrpSpPr>
-        <p:cNvPr id="1" name=""/>
-        <p:cNvGrpSpPr/>
-        <p:nvPr/>
-      </p:nvGrpSpPr>
-      <p:grpSpPr>
-        <a:xfrm>
-          <a:off x="0" y="0"/>
-          <a:ext cx="0" cy="0"/>
-          <a:chOff x="0" y="0"/>
-          <a:chExt cx="0" cy="0"/>
-        </a:xfrm>
-      </p:grpSpPr>
-      <p:sp>
-        <p:nvSpPr>
-          <p:cNvPr id="4" name="Title 3">
-            <a:extLst>
-              <a:ext uri="{FF2B5EF4-FFF2-40B4-BE49-F238E27FC236}">
-                <a16:creationId xmlns:a16="http://schemas.microsoft.com/office/drawing/2014/main" id="{80EAC0C6-7B8A-1444-CF6E-AFD7613F9128}"/>
-              </a:ext>
-            </a:extLst>
-          </p:cNvPr>
-          <p:cNvSpPr>
-            <a:spLocks noGrp="1"/>
-          </p:cNvSpPr>
-          <p:nvPr>
-            <p:ph type="title"/>
-          </p:nvPr>
-        </p:nvSpPr>
-        <p:spPr/>
-        <p:txBody>
-          <a:bodyPr/>
-          <a:lstStyle/>
-          <a:p>
-            <a:r>
-              <a:rPr lang="en-CA" dirty="0"/>
-              <a:t>5. </a:t>
-            </a:r>
-            <a:r>
-              <a:rPr lang="en-US" dirty="0"/>
-              <a:t>Water drop</a:t>
-            </a:r>
-            <a:endParaRPr lang="en-CA" dirty="0"/>
-          </a:p>
-        </p:txBody>
-      </p:sp>
-      <p:sp>
-        <p:nvSpPr>
-          <p:cNvPr id="5" name="Content Placeholder 4">
-            <a:extLst>
-              <a:ext uri="{FF2B5EF4-FFF2-40B4-BE49-F238E27FC236}">
-                <a16:creationId xmlns:a16="http://schemas.microsoft.com/office/drawing/2014/main" id="{916B2140-6178-6477-FAC2-4FC081B9C2C5}"/>
-              </a:ext>
-            </a:extLst>
-          </p:cNvPr>
-          <p:cNvSpPr>
-            <a:spLocks noGrp="1"/>
-          </p:cNvSpPr>
-          <p:nvPr>
-            <p:ph idx="1"/>
-          </p:nvPr>
-        </p:nvSpPr>
-        <p:spPr/>
-        <p:txBody>
-          <a:bodyPr>
-            <a:normAutofit fontScale="92500"/>
-          </a:bodyPr>
-          <a:lstStyle/>
-          <a:p>
-            <a:r>
-              <a:rPr lang="en-US" dirty="0"/>
-              <a:t>So far, the domain only allows two actions: </a:t>
-            </a:r>
-            <a:r>
-              <a:rPr lang="en-US" b="1" dirty="0"/>
-              <a:t>put-out</a:t>
-            </a:r>
-            <a:r>
-              <a:rPr lang="en-US" dirty="0"/>
-              <a:t> and </a:t>
-            </a:r>
-            <a:r>
-              <a:rPr lang="en-US" b="1" dirty="0"/>
-              <a:t>cut-out</a:t>
-            </a:r>
-            <a:br>
-              <a:rPr lang="en-US" b="1" dirty="0"/>
-            </a:br>
-            <a:endParaRPr lang="en-US" b="1" dirty="0"/>
-          </a:p>
-          <a:p>
-            <a:r>
-              <a:rPr lang="en-US" dirty="0"/>
-              <a:t>Add a third action to allow a single aerial water drop which has high cost and puts out a fire in all cells neighboring where the water is dropped.</a:t>
-            </a:r>
-          </a:p>
-          <a:p>
-            <a:endParaRPr lang="en-US" dirty="0"/>
-          </a:p>
-          <a:p>
-            <a:r>
-              <a:rPr lang="en-US" dirty="0"/>
-              <a:t>Note that this change requires addition of an action fluent and changes to the </a:t>
-            </a:r>
-            <a:r>
-              <a:rPr lang="en-US" dirty="0" err="1"/>
-              <a:t>cpfs</a:t>
-            </a:r>
-            <a:r>
-              <a:rPr lang="en-US" dirty="0"/>
-              <a:t>, rewards, and state-action-constraints (max of one drop).</a:t>
-            </a:r>
-            <a:endParaRPr lang="en-CA" dirty="0"/>
-          </a:p>
-          <a:p>
-            <a:endParaRPr lang="en-CA" dirty="0"/>
-          </a:p>
-          <a:p>
-            <a:pPr marL="0" indent="0" algn="ctr">
-              <a:buNone/>
-            </a:pPr>
-            <a:r>
-              <a:rPr lang="en-CA" sz="2800" dirty="0"/>
-              <a:t>http://editor.planning.domains/planning-course/rddl/v5</a:t>
-            </a:r>
-            <a:endParaRPr lang="en-CA" dirty="0"/>
-          </a:p>
-        </p:txBody>
-      </p:sp>
-    </p:spTree>
-    <p:extLst>
-      <p:ext uri="{BB962C8B-B14F-4D97-AF65-F5344CB8AC3E}">
-        <p14:creationId xmlns:p14="http://schemas.microsoft.com/office/powerpoint/2010/main" val="2852421980"/>
-      </p:ext>
-    </p:extLst>
-  </p:cSld>
-  <p:clrMapOvr>
-    <a:masterClrMapping/>
-  </p:clrMapOvr>
 </p:sld>
 </file>
 
@@ -11330,6 +11258,152 @@
       </p:grpSpPr>
       <p:sp>
         <p:nvSpPr>
+          <p:cNvPr id="4" name="Title 3">
+            <a:extLst>
+              <a:ext uri="{FF2B5EF4-FFF2-40B4-BE49-F238E27FC236}">
+                <a16:creationId xmlns:a16="http://schemas.microsoft.com/office/drawing/2014/main" id="{80EAC0C6-7B8A-1444-CF6E-AFD7613F9128}"/>
+              </a:ext>
+            </a:extLst>
+          </p:cNvPr>
+          <p:cNvSpPr>
+            <a:spLocks noGrp="1"/>
+          </p:cNvSpPr>
+          <p:nvPr>
+            <p:ph type="title"/>
+          </p:nvPr>
+        </p:nvSpPr>
+        <p:spPr/>
+        <p:txBody>
+          <a:bodyPr/>
+          <a:lstStyle/>
+          <a:p>
+            <a:r>
+              <a:rPr lang="en-CA" dirty="0"/>
+              <a:t>5. </a:t>
+            </a:r>
+            <a:r>
+              <a:rPr lang="en-US" dirty="0"/>
+              <a:t>Water drop</a:t>
+            </a:r>
+            <a:endParaRPr lang="en-CA" dirty="0"/>
+          </a:p>
+        </p:txBody>
+      </p:sp>
+      <p:sp>
+        <p:nvSpPr>
+          <p:cNvPr id="5" name="Content Placeholder 4">
+            <a:extLst>
+              <a:ext uri="{FF2B5EF4-FFF2-40B4-BE49-F238E27FC236}">
+                <a16:creationId xmlns:a16="http://schemas.microsoft.com/office/drawing/2014/main" id="{916B2140-6178-6477-FAC2-4FC081B9C2C5}"/>
+              </a:ext>
+            </a:extLst>
+          </p:cNvPr>
+          <p:cNvSpPr>
+            <a:spLocks noGrp="1"/>
+          </p:cNvSpPr>
+          <p:nvPr>
+            <p:ph idx="1"/>
+          </p:nvPr>
+        </p:nvSpPr>
+        <p:spPr/>
+        <p:txBody>
+          <a:bodyPr>
+            <a:normAutofit fontScale="92500"/>
+          </a:bodyPr>
+          <a:lstStyle/>
+          <a:p>
+            <a:r>
+              <a:rPr lang="en-US" dirty="0"/>
+              <a:t>So far, the domain only allows two actions: </a:t>
+            </a:r>
+            <a:r>
+              <a:rPr lang="en-US" b="1" dirty="0"/>
+              <a:t>put-out</a:t>
+            </a:r>
+            <a:r>
+              <a:rPr lang="en-US" dirty="0"/>
+              <a:t> and </a:t>
+            </a:r>
+            <a:r>
+              <a:rPr lang="en-US" b="1" dirty="0"/>
+              <a:t>cut-out</a:t>
+            </a:r>
+            <a:br>
+              <a:rPr lang="en-US" b="1" dirty="0"/>
+            </a:br>
+            <a:endParaRPr lang="en-US" b="1" dirty="0"/>
+          </a:p>
+          <a:p>
+            <a:r>
+              <a:rPr lang="en-US" dirty="0"/>
+              <a:t>Add a third action to allow a single aerial water drop which has high cost and puts out a fire in all cells neighboring where the water is dropped.</a:t>
+            </a:r>
+          </a:p>
+          <a:p>
+            <a:endParaRPr lang="en-US" dirty="0"/>
+          </a:p>
+          <a:p>
+            <a:r>
+              <a:rPr lang="en-US" dirty="0"/>
+              <a:t>Note that this change requires addition of an action fluent and changes to the </a:t>
+            </a:r>
+            <a:r>
+              <a:rPr lang="en-US" dirty="0" err="1"/>
+              <a:t>cpfs</a:t>
+            </a:r>
+            <a:r>
+              <a:rPr lang="en-US" dirty="0"/>
+              <a:t>, rewards, and state-action-constraints (max of one drop).</a:t>
+            </a:r>
+            <a:endParaRPr lang="en-CA" dirty="0"/>
+          </a:p>
+          <a:p>
+            <a:endParaRPr lang="en-CA" dirty="0"/>
+          </a:p>
+          <a:p>
+            <a:pPr marL="0" indent="0" algn="ctr">
+              <a:buNone/>
+            </a:pPr>
+            <a:r>
+              <a:rPr lang="en-CA" sz="2800" dirty="0"/>
+              <a:t>http://editor.planning.domains/planning-course/rddl/v5</a:t>
+            </a:r>
+            <a:endParaRPr lang="en-CA" dirty="0"/>
+          </a:p>
+        </p:txBody>
+      </p:sp>
+    </p:spTree>
+    <p:extLst>
+      <p:ext uri="{BB962C8B-B14F-4D97-AF65-F5344CB8AC3E}">
+        <p14:creationId xmlns:p14="http://schemas.microsoft.com/office/powerpoint/2010/main" val="2852421980"/>
+      </p:ext>
+    </p:extLst>
+  </p:cSld>
+  <p:clrMapOvr>
+    <a:masterClrMapping/>
+  </p:clrMapOvr>
+</p:sld>
+</file>
+
+<file path=ppt/slides/slide31.xml><?xml version="1.0" encoding="utf-8"?>
+<p:sld xmlns:a="http://schemas.openxmlformats.org/drawingml/2006/main" xmlns:r="http://schemas.openxmlformats.org/officeDocument/2006/relationships" xmlns:p="http://schemas.openxmlformats.org/presentationml/2006/main" showMasterSp="0">
+  <p:cSld>
+    <p:spTree>
+      <p:nvGrpSpPr>
+        <p:cNvPr id="1" name=""/>
+        <p:cNvGrpSpPr/>
+        <p:nvPr/>
+      </p:nvGrpSpPr>
+      <p:grpSpPr>
+        <a:xfrm>
+          <a:off x="0" y="0"/>
+          <a:ext cx="0" cy="0"/>
+          <a:chOff x="0" y="0"/>
+          <a:chExt cx="0" cy="0"/>
+        </a:xfrm>
+      </p:grpSpPr>
+      <p:sp>
+        <p:nvSpPr>
           <p:cNvPr id="5" name="Content Placeholder 4">
             <a:extLst>
               <a:ext uri="{FF2B5EF4-FFF2-40B4-BE49-F238E27FC236}">
@@ -11396,7 +11470,7 @@
 </p:sld>
 </file>
 
-<file path=ppt/slides/slide31.xml><?xml version="1.0" encoding="utf-8"?>
+<file path=ppt/slides/slide32.xml><?xml version="1.0" encoding="utf-8"?>
 <p:sld xmlns:a="http://schemas.openxmlformats.org/drawingml/2006/main" xmlns:r="http://schemas.openxmlformats.org/officeDocument/2006/relationships" xmlns:p="http://schemas.openxmlformats.org/presentationml/2006/main" showMasterSp="0">
   <p:cSld>
     <p:spTree>
@@ -11741,6 +11815,196 @@
       </p:grpSpPr>
       <p:sp>
         <p:nvSpPr>
+          <p:cNvPr id="3" name="Title 2">
+            <a:extLst>
+              <a:ext uri="{FF2B5EF4-FFF2-40B4-BE49-F238E27FC236}">
+                <a16:creationId xmlns:a16="http://schemas.microsoft.com/office/drawing/2014/main" id="{06789630-9B0F-0775-9CF4-6BCE85CCD403}"/>
+              </a:ext>
+            </a:extLst>
+          </p:cNvPr>
+          <p:cNvSpPr>
+            <a:spLocks noGrp="1"/>
+          </p:cNvSpPr>
+          <p:nvPr>
+            <p:ph type="title"/>
+          </p:nvPr>
+        </p:nvSpPr>
+        <p:spPr/>
+        <p:txBody>
+          <a:bodyPr/>
+          <a:lstStyle/>
+          <a:p>
+            <a:r>
+              <a:rPr lang="en-US" dirty="0"/>
+              <a:t>Gotchas!!</a:t>
+            </a:r>
+            <a:endParaRPr lang="en-CA" dirty="0"/>
+          </a:p>
+        </p:txBody>
+      </p:sp>
+      <p:sp>
+        <p:nvSpPr>
+          <p:cNvPr id="4" name="Content Placeholder 3">
+            <a:extLst>
+              <a:ext uri="{FF2B5EF4-FFF2-40B4-BE49-F238E27FC236}">
+                <a16:creationId xmlns:a16="http://schemas.microsoft.com/office/drawing/2014/main" id="{7A08B150-AC72-50DB-ED3E-62216D38E5AF}"/>
+              </a:ext>
+            </a:extLst>
+          </p:cNvPr>
+          <p:cNvSpPr>
+            <a:spLocks noGrp="1"/>
+          </p:cNvSpPr>
+          <p:nvPr>
+            <p:ph idx="1"/>
+          </p:nvPr>
+        </p:nvSpPr>
+        <p:spPr/>
+        <p:txBody>
+          <a:bodyPr/>
+          <a:lstStyle/>
+          <a:p>
+            <a:r>
+              <a:rPr lang="en-US" strike="sngStrike" dirty="0"/>
+              <a:t>Careful with brackets:</a:t>
+            </a:r>
+          </a:p>
+          <a:p>
+            <a:pPr lvl="1"/>
+            <a:r>
+              <a:rPr lang="en-US" strike="sngStrike" dirty="0"/>
+              <a:t>Good: </a:t>
+            </a:r>
+            <a:r>
+              <a:rPr lang="en-US" strike="sngStrike" dirty="0" err="1"/>
+              <a:t>func</a:t>
+            </a:r>
+            <a:r>
+              <a:rPr lang="en-US" strike="sngStrike" dirty="0"/>
+              <a:t>(?x, ?y)</a:t>
+            </a:r>
+          </a:p>
+          <a:p>
+            <a:pPr lvl="1"/>
+            <a:r>
+              <a:rPr lang="en-US" strike="sngStrike" dirty="0"/>
+              <a:t>Bad: </a:t>
+            </a:r>
+            <a:r>
+              <a:rPr lang="en-US" strike="sngStrike" dirty="0" err="1"/>
+              <a:t>func</a:t>
+            </a:r>
+            <a:r>
+              <a:rPr lang="en-US" strike="sngStrike" dirty="0"/>
+              <a:t>(?</a:t>
+            </a:r>
+            <a:r>
+              <a:rPr lang="en-US" strike="sngStrike" dirty="0" err="1"/>
+              <a:t>x,?y</a:t>
+            </a:r>
+            <a:r>
+              <a:rPr lang="en-US" strike="sngStrike" dirty="0"/>
+              <a:t>)</a:t>
+            </a:r>
+            <a:br>
+              <a:rPr lang="en-US" dirty="0"/>
+            </a:br>
+            <a:endParaRPr lang="en-US" dirty="0"/>
+          </a:p>
+          <a:p>
+            <a:r>
+              <a:rPr lang="en-US" strike="sngStrike" dirty="0"/>
+              <a:t>Careful with multi-line equality:</a:t>
+            </a:r>
+          </a:p>
+          <a:p>
+            <a:pPr lvl="1"/>
+            <a:r>
+              <a:rPr lang="en-US" strike="sngStrike" dirty="0"/>
+              <a:t>Need to have a space after the “=” sign</a:t>
+            </a:r>
+            <a:br>
+              <a:rPr lang="en-US" dirty="0"/>
+            </a:br>
+            <a:endParaRPr lang="en-US" dirty="0"/>
+          </a:p>
+          <a:p>
+            <a:r>
+              <a:rPr lang="en-US" dirty="0"/>
+              <a:t>Depth of trial is given in the instance (# of trials on the </a:t>
+            </a:r>
+            <a:r>
+              <a:rPr lang="en-US" dirty="0" err="1"/>
+              <a:t>cmd</a:t>
+            </a:r>
+            <a:r>
+              <a:rPr lang="en-US" dirty="0"/>
+              <a:t>-line)</a:t>
+            </a:r>
+            <a:br>
+              <a:rPr lang="en-US" dirty="0"/>
+            </a:br>
+            <a:endParaRPr lang="en-US" dirty="0"/>
+          </a:p>
+          <a:p>
+            <a:r>
+              <a:rPr lang="en-US" strike="sngStrike" dirty="0"/>
+              <a:t>If </a:t>
+            </a:r>
+            <a:r>
+              <a:rPr lang="en-US" strike="sngStrike" dirty="0" err="1"/>
+              <a:t>pyRDDL</a:t>
+            </a:r>
+            <a:r>
+              <a:rPr lang="en-US" strike="sngStrike" dirty="0"/>
+              <a:t> states “Address already in use”, restart the docker</a:t>
+            </a:r>
+          </a:p>
+        </p:txBody>
+      </p:sp>
+    </p:spTree>
+    <p:extLst>
+      <p:ext uri="{BB962C8B-B14F-4D97-AF65-F5344CB8AC3E}">
+        <p14:creationId xmlns:p14="http://schemas.microsoft.com/office/powerpoint/2010/main" val="1765292032"/>
+      </p:ext>
+    </p:extLst>
+  </p:cSld>
+  <p:clrMapOvr>
+    <a:masterClrMapping/>
+  </p:clrMapOvr>
+  <mc:AlternateContent xmlns:mc="http://schemas.openxmlformats.org/markup-compatibility/2006">
+    <mc:Choice xmlns:p14="http://schemas.microsoft.com/office/powerpoint/2010/main" Requires="p14">
+      <p:transition spd="med" p14:dur="700">
+        <p:fade/>
+      </p:transition>
+    </mc:Choice>
+    <mc:Fallback>
+      <p:transition spd="med">
+        <p:fade/>
+      </p:transition>
+    </mc:Fallback>
+  </mc:AlternateContent>
+</p:sld>
+</file>
+
+<file path=ppt/slides/slide7.xml><?xml version="1.0" encoding="utf-8"?>
+<p:sld xmlns:a="http://schemas.openxmlformats.org/drawingml/2006/main" xmlns:r="http://schemas.openxmlformats.org/officeDocument/2006/relationships" xmlns:p="http://schemas.openxmlformats.org/presentationml/2006/main">
+  <p:cSld>
+    <p:spTree>
+      <p:nvGrpSpPr>
+        <p:cNvPr id="1" name=""/>
+        <p:cNvGrpSpPr/>
+        <p:nvPr/>
+      </p:nvGrpSpPr>
+      <p:grpSpPr>
+        <a:xfrm>
+          <a:off x="0" y="0"/>
+          <a:ext cx="0" cy="0"/>
+          <a:chOff x="0" y="0"/>
+          <a:chExt cx="0" cy="0"/>
+        </a:xfrm>
+      </p:grpSpPr>
+      <p:sp>
+        <p:nvSpPr>
           <p:cNvPr id="178" name="Moving Crates"/>
           <p:cNvSpPr txBox="1">
             <a:spLocks noGrp="1"/>
@@ -11985,7 +12249,7 @@
 </p:sld>
 </file>
 
-<file path=ppt/slides/slide7.xml><?xml version="1.0" encoding="utf-8"?>
+<file path=ppt/slides/slide8.xml><?xml version="1.0" encoding="utf-8"?>
 <p:sld xmlns:a="http://schemas.openxmlformats.org/drawingml/2006/main" xmlns:r="http://schemas.openxmlformats.org/officeDocument/2006/relationships" xmlns:p="http://schemas.openxmlformats.org/presentationml/2006/main" showMasterSp="0">
   <p:cSld>
     <p:spTree>
@@ -12058,7 +12322,7 @@
 </p:sld>
 </file>
 
-<file path=ppt/slides/slide8.xml><?xml version="1.0" encoding="utf-8"?>
+<file path=ppt/slides/slide9.xml><?xml version="1.0" encoding="utf-8"?>
 <p:sld xmlns:a="http://schemas.openxmlformats.org/drawingml/2006/main" xmlns:r="http://schemas.openxmlformats.org/officeDocument/2006/relationships" xmlns:p="http://schemas.openxmlformats.org/presentationml/2006/main" showMasterSp="0">
   <p:cSld>
     <p:spTree>
@@ -12150,79 +12414,6 @@
     <p:extLst>
       <p:ext uri="{BB962C8B-B14F-4D97-AF65-F5344CB8AC3E}">
         <p14:creationId xmlns:p14="http://schemas.microsoft.com/office/powerpoint/2010/main" val="1315833981"/>
-      </p:ext>
-    </p:extLst>
-  </p:cSld>
-  <p:clrMapOvr>
-    <a:masterClrMapping/>
-  </p:clrMapOvr>
-</p:sld>
-</file>
-
-<file path=ppt/slides/slide9.xml><?xml version="1.0" encoding="utf-8"?>
-<p:sld xmlns:a="http://schemas.openxmlformats.org/drawingml/2006/main" xmlns:r="http://schemas.openxmlformats.org/officeDocument/2006/relationships" xmlns:p="http://schemas.openxmlformats.org/presentationml/2006/main" showMasterSp="0">
-  <p:cSld>
-    <p:spTree>
-      <p:nvGrpSpPr>
-        <p:cNvPr id="1" name=""/>
-        <p:cNvGrpSpPr/>
-        <p:nvPr/>
-      </p:nvGrpSpPr>
-      <p:grpSpPr>
-        <a:xfrm>
-          <a:off x="0" y="0"/>
-          <a:ext cx="0" cy="0"/>
-          <a:chOff x="0" y="0"/>
-          <a:chExt cx="0" cy="0"/>
-        </a:xfrm>
-      </p:grpSpPr>
-      <p:pic>
-        <p:nvPicPr>
-          <p:cNvPr id="7" name="Picture 6">
-            <a:extLst>
-              <a:ext uri="{FF2B5EF4-FFF2-40B4-BE49-F238E27FC236}">
-                <a16:creationId xmlns:a16="http://schemas.microsoft.com/office/drawing/2014/main" id="{D953F485-84BC-A785-4E31-90917F0BC7D6}"/>
-              </a:ext>
-            </a:extLst>
-          </p:cNvPr>
-          <p:cNvPicPr>
-            <a:picLocks noChangeAspect="1"/>
-          </p:cNvPicPr>
-          <p:nvPr/>
-        </p:nvPicPr>
-        <p:blipFill>
-          <a:blip r:embed="rId2"/>
-          <a:stretch>
-            <a:fillRect/>
-          </a:stretch>
-        </p:blipFill>
-        <p:spPr>
-          <a:xfrm>
-            <a:off x="3423864" y="1357023"/>
-            <a:ext cx="5344271" cy="4143953"/>
-          </a:xfrm>
-          <a:prstGeom prst="roundRect">
-            <a:avLst>
-              <a:gd name="adj" fmla="val 8594"/>
-            </a:avLst>
-          </a:prstGeom>
-          <a:solidFill>
-            <a:srgbClr val="FFFFFF">
-              <a:shade val="85000"/>
-            </a:srgbClr>
-          </a:solidFill>
-          <a:ln>
-            <a:noFill/>
-          </a:ln>
-          <a:effectLst>
-            <a:reflection blurRad="12700" stA="38000" endPos="28000" dist="5000" dir="5400000" sy="-100000" algn="bl" rotWithShape="0"/>
-          </a:effectLst>
-        </p:spPr>
-      </p:pic>
-    </p:spTree>
-    <p:extLst>
-      <p:ext uri="{BB962C8B-B14F-4D97-AF65-F5344CB8AC3E}">
-        <p14:creationId xmlns:p14="http://schemas.microsoft.com/office/powerpoint/2010/main" val="2842933087"/>
       </p:ext>
     </p:extLst>
   </p:cSld>

</xml_diff>

<commit_message>
Finished getting the rddl tutorial ready.
</commit_message>
<xml_diff>
--- a/exercises/cisc-813/rddl/slides.pptx
+++ b/exercises/cisc-813/rddl/slides.pptx
@@ -709,7 +709,7 @@
           <a:p>
             <a:fld id="{D6D0F569-AC90-44EB-9EF4-4E5C2F5D823C}" type="datetime1">
               <a:rPr lang="en-US" smtClean="0"/>
-              <a:t>1/9/2023</a:t>
+              <a:t>2/14/2023</a:t>
             </a:fld>
             <a:endParaRPr lang="en-US" dirty="0"/>
           </a:p>
@@ -1388,7 +1388,7 @@
           <a:p>
             <a:fld id="{46BA7D41-E8B7-4A0B-B861-3EC4AE88917D}" type="datetime1">
               <a:rPr lang="en-US" smtClean="0"/>
-              <a:t>1/9/2023</a:t>
+              <a:t>2/14/2023</a:t>
             </a:fld>
             <a:endParaRPr lang="en-US" dirty="0"/>
           </a:p>
@@ -2077,7 +2077,7 @@
           <a:p>
             <a:fld id="{A7C34823-0B19-4B4E-A643-7A3B0A3D24D6}" type="datetime1">
               <a:rPr lang="en-US" smtClean="0"/>
-              <a:t>1/9/2023</a:t>
+              <a:t>2/14/2023</a:t>
             </a:fld>
             <a:endParaRPr lang="en-US" dirty="0"/>
           </a:p>
@@ -3200,7 +3200,7 @@
           <a:p>
             <a:fld id="{8C2D79EF-17C8-45D8-9866-DAF5723FC604}" type="datetime1">
               <a:rPr lang="en-US" smtClean="0"/>
-              <a:t>1/9/2023</a:t>
+              <a:t>2/14/2023</a:t>
             </a:fld>
             <a:endParaRPr lang="en-US" dirty="0"/>
           </a:p>
@@ -3955,7 +3955,7 @@
           <a:p>
             <a:fld id="{DFFC2ADC-3680-4013-A757-E4663495DB98}" type="datetime1">
               <a:rPr lang="en-US" smtClean="0"/>
-              <a:t>1/9/2023</a:t>
+              <a:t>2/14/2023</a:t>
             </a:fld>
             <a:endParaRPr lang="en-US" dirty="0"/>
           </a:p>
@@ -4702,7 +4702,7 @@
           <a:p>
             <a:fld id="{4751BA94-5DCA-4F19-960F-0FB2BD5EE85A}" type="datetime1">
               <a:rPr lang="en-US" smtClean="0"/>
-              <a:t>1/9/2023</a:t>
+              <a:t>2/14/2023</a:t>
             </a:fld>
             <a:endParaRPr lang="en-US" dirty="0"/>
           </a:p>
@@ -5596,7 +5596,7 @@
           <a:p>
             <a:fld id="{01BED947-38D9-44AC-8B89-E79758333B77}" type="datetime1">
               <a:rPr lang="en-US" smtClean="0"/>
-              <a:t>1/9/2023</a:t>
+              <a:t>2/14/2023</a:t>
             </a:fld>
             <a:endParaRPr lang="en-US" dirty="0"/>
           </a:p>
@@ -6217,7 +6217,7 @@
           <a:p>
             <a:fld id="{3781E23F-BD3C-4F23-B116-2B758120C8AC}" type="datetime1">
               <a:rPr lang="en-US" smtClean="0"/>
-              <a:t>1/9/2023</a:t>
+              <a:t>2/14/2023</a:t>
             </a:fld>
             <a:endParaRPr lang="en-US" dirty="0"/>
           </a:p>
@@ -6809,7 +6809,7 @@
           <a:p>
             <a:fld id="{473CFAA9-6D59-4D98-869E-ACBDB83B2CA4}" type="datetime1">
               <a:rPr lang="en-US" smtClean="0"/>
-              <a:t>1/9/2023</a:t>
+              <a:t>2/14/2023</a:t>
             </a:fld>
             <a:endParaRPr lang="en-US"/>
           </a:p>
@@ -7601,7 +7601,7 @@
           <a:p>
             <a:fld id="{DC410804-27E3-430A-BB42-B831260DE39A}" type="datetime1">
               <a:rPr lang="en-US" smtClean="0"/>
-              <a:t>1/9/2023</a:t>
+              <a:t>2/14/2023</a:t>
             </a:fld>
             <a:endParaRPr lang="en-US" dirty="0"/>
           </a:p>
@@ -8372,7 +8372,7 @@
           <a:p>
             <a:fld id="{60E22DE3-3D1A-4D53-B9A6-6C7463B8C992}" type="datetime1">
               <a:rPr lang="en-US" smtClean="0"/>
-              <a:t>1/9/2023</a:t>
+              <a:t>2/14/2023</a:t>
             </a:fld>
             <a:endParaRPr lang="en-US" dirty="0"/>
           </a:p>
@@ -8683,7 +8683,7 @@
             <a:fld id="{5ECD8B30-1B71-45A1-8314-D59C86F581E1}" type="datetime1">
               <a:rPr lang="en-US" smtClean="0"/>
               <a:pPr/>
-              <a:t>1/9/2023</a:t>
+              <a:t>2/14/2023</a:t>
             </a:fld>
             <a:endParaRPr lang="en-US" b="1" dirty="0"/>
           </a:p>
@@ -10353,9 +10353,16 @@
             <p:ph idx="1"/>
           </p:nvPr>
         </p:nvSpPr>
-        <p:spPr/>
+        <p:spPr>
+          <a:xfrm>
+            <a:off x="838199" y="1825625"/>
+            <a:ext cx="10689077" cy="4351338"/>
+          </a:xfrm>
+        </p:spPr>
         <p:txBody>
-          <a:bodyPr/>
+          <a:bodyPr>
+            <a:normAutofit fontScale="92500" lnSpcReduction="10000"/>
+          </a:bodyPr>
           <a:lstStyle/>
           <a:p>
             <a:pPr marL="514350" indent="-514350">
@@ -10387,56 +10394,58 @@
               <a:rPr lang="en-CA" dirty="0"/>
             </a:br>
             <a:r>
-              <a:rPr lang="en-CA" dirty="0"/>
-              <a:t>	</a:t>
-            </a:r>
-            <a:r>
-              <a:rPr lang="en-CA" b="1" dirty="0"/>
-              <a:t>docker run -it -v $(</a:t>
-            </a:r>
-            <a:r>
-              <a:rPr lang="en-CA" b="1" dirty="0" err="1"/>
+              <a:rPr lang="en-US" sz="2400" b="1" dirty="0"/>
+              <a:t>docker run -it --privileged -v $(</a:t>
+            </a:r>
+            <a:r>
+              <a:rPr lang="en-US" sz="2400" b="1" dirty="0" err="1"/>
               <a:t>pwd</a:t>
             </a:r>
             <a:r>
-              <a:rPr lang="en-CA" b="1" dirty="0"/>
-              <a:t>)/PROJECT cisc813/</a:t>
-            </a:r>
-            <a:r>
-              <a:rPr lang="en-CA" b="1" dirty="0" err="1"/>
-              <a:t>prost</a:t>
+              <a:rPr lang="en-US" sz="2400" b="1" dirty="0"/>
+              <a:t>):/PROJECT </a:t>
+            </a:r>
+            <a:r>
+              <a:rPr lang="en-US" sz="2400" b="1" dirty="0" err="1"/>
+              <a:t>cjmuise</a:t>
+            </a:r>
+            <a:r>
+              <a:rPr lang="en-US" sz="2400" b="1" dirty="0"/>
+              <a:t>/cisc813-rddlprost</a:t>
+            </a:r>
+            <a:br>
+              <a:rPr lang="en-CA" sz="2400" b="1" dirty="0"/>
+            </a:br>
+            <a:br>
+              <a:rPr lang="en-CA" sz="2400" b="1" dirty="0"/>
+            </a:br>
+            <a:r>
+              <a:rPr lang="en-CA" sz="2400" b="1" dirty="0" err="1"/>
+              <a:t>rddlprost</a:t>
+            </a:r>
+            <a:r>
+              <a:rPr lang="en-CA" sz="2400" b="1" dirty="0"/>
+              <a:t> </a:t>
+            </a:r>
+            <a:r>
+              <a:rPr lang="en-CA" sz="2400" b="1" dirty="0" err="1"/>
+              <a:t>domain.rddl</a:t>
+            </a:r>
+            <a:r>
+              <a:rPr lang="en-CA" sz="2400" b="1" dirty="0"/>
+              <a:t> </a:t>
+            </a:r>
+            <a:r>
+              <a:rPr lang="en-CA" sz="2400" b="1" dirty="0" err="1"/>
+              <a:t>instance.rddl</a:t>
+            </a:r>
+            <a:r>
+              <a:rPr lang="en-CA" sz="2400" b="1" dirty="0"/>
+              <a:t> 1 10</a:t>
             </a:r>
             <a:br>
               <a:rPr lang="en-CA" b="1" dirty="0"/>
             </a:br>
-            <a:r>
-              <a:rPr lang="en-CA" b="1" dirty="0"/>
-              <a:t>	</a:t>
-            </a:r>
-            <a:r>
-              <a:rPr lang="en-CA" b="1" dirty="0" err="1"/>
-              <a:t>rddlprost</a:t>
-            </a:r>
-            <a:r>
-              <a:rPr lang="en-CA" b="1" dirty="0"/>
-              <a:t> </a:t>
-            </a:r>
-            <a:r>
-              <a:rPr lang="en-CA" b="1" dirty="0" err="1"/>
-              <a:t>domain.rddl</a:t>
-            </a:r>
-            <a:r>
-              <a:rPr lang="en-CA" b="1" dirty="0"/>
-              <a:t> </a:t>
-            </a:r>
-            <a:r>
-              <a:rPr lang="en-CA" b="1" dirty="0" err="1"/>
-              <a:t>instance.rddl</a:t>
-            </a:r>
-            <a:r>
-              <a:rPr lang="en-CA" b="1" dirty="0"/>
-              <a:t> 1 10</a:t>
-            </a:r>
             <a:br>
               <a:rPr lang="en-CA" b="1" dirty="0"/>
             </a:br>
@@ -10471,7 +10480,7 @@
             </a:r>
             <a:r>
               <a:rPr lang="en-CA" b="1" dirty="0"/>
-              <a:t>python viz.py </a:t>
+              <a:t>viz </a:t>
             </a:r>
             <a:r>
               <a:rPr lang="en-CA" b="1" dirty="0" err="1"/>
@@ -11971,13 +11980,13 @@
   <p:clrMapOvr>
     <a:masterClrMapping/>
   </p:clrMapOvr>
-  <mc:AlternateContent xmlns:mc="http://schemas.openxmlformats.org/markup-compatibility/2006">
-    <mc:Choice xmlns:p14="http://schemas.microsoft.com/office/powerpoint/2010/main" Requires="p14">
+  <mc:AlternateContent xmlns:mc="http://schemas.openxmlformats.org/markup-compatibility/2006" xmlns:p14="http://schemas.microsoft.com/office/powerpoint/2010/main">
+    <mc:Choice Requires="p14">
       <p:transition spd="med" p14:dur="700">
         <p:fade/>
       </p:transition>
     </mc:Choice>
-    <mc:Fallback>
+    <mc:Fallback xmlns="">
       <p:transition spd="med">
         <p:fade/>
       </p:transition>

</xml_diff>

<commit_message>
Separated out the effect from the observation.
</commit_message>
<xml_diff>
--- a/exercises/cisc-813/rddl/slides.pptx
+++ b/exercises/cisc-813/rddl/slides.pptx
@@ -709,7 +709,7 @@
           <a:p>
             <a:fld id="{D6D0F569-AC90-44EB-9EF4-4E5C2F5D823C}" type="datetime1">
               <a:rPr lang="en-US" smtClean="0"/>
-              <a:t>2/14/2023</a:t>
+              <a:t>2/16/2023</a:t>
             </a:fld>
             <a:endParaRPr lang="en-US" dirty="0"/>
           </a:p>
@@ -1388,7 +1388,7 @@
           <a:p>
             <a:fld id="{46BA7D41-E8B7-4A0B-B861-3EC4AE88917D}" type="datetime1">
               <a:rPr lang="en-US" smtClean="0"/>
-              <a:t>2/14/2023</a:t>
+              <a:t>2/16/2023</a:t>
             </a:fld>
             <a:endParaRPr lang="en-US" dirty="0"/>
           </a:p>
@@ -2077,7 +2077,7 @@
           <a:p>
             <a:fld id="{A7C34823-0B19-4B4E-A643-7A3B0A3D24D6}" type="datetime1">
               <a:rPr lang="en-US" smtClean="0"/>
-              <a:t>2/14/2023</a:t>
+              <a:t>2/16/2023</a:t>
             </a:fld>
             <a:endParaRPr lang="en-US" dirty="0"/>
           </a:p>
@@ -3200,7 +3200,7 @@
           <a:p>
             <a:fld id="{8C2D79EF-17C8-45D8-9866-DAF5723FC604}" type="datetime1">
               <a:rPr lang="en-US" smtClean="0"/>
-              <a:t>2/14/2023</a:t>
+              <a:t>2/16/2023</a:t>
             </a:fld>
             <a:endParaRPr lang="en-US" dirty="0"/>
           </a:p>
@@ -3955,7 +3955,7 @@
           <a:p>
             <a:fld id="{DFFC2ADC-3680-4013-A757-E4663495DB98}" type="datetime1">
               <a:rPr lang="en-US" smtClean="0"/>
-              <a:t>2/14/2023</a:t>
+              <a:t>2/16/2023</a:t>
             </a:fld>
             <a:endParaRPr lang="en-US" dirty="0"/>
           </a:p>
@@ -4702,7 +4702,7 @@
           <a:p>
             <a:fld id="{4751BA94-5DCA-4F19-960F-0FB2BD5EE85A}" type="datetime1">
               <a:rPr lang="en-US" smtClean="0"/>
-              <a:t>2/14/2023</a:t>
+              <a:t>2/16/2023</a:t>
             </a:fld>
             <a:endParaRPr lang="en-US" dirty="0"/>
           </a:p>
@@ -5596,7 +5596,7 @@
           <a:p>
             <a:fld id="{01BED947-38D9-44AC-8B89-E79758333B77}" type="datetime1">
               <a:rPr lang="en-US" smtClean="0"/>
-              <a:t>2/14/2023</a:t>
+              <a:t>2/16/2023</a:t>
             </a:fld>
             <a:endParaRPr lang="en-US" dirty="0"/>
           </a:p>
@@ -6217,7 +6217,7 @@
           <a:p>
             <a:fld id="{3781E23F-BD3C-4F23-B116-2B758120C8AC}" type="datetime1">
               <a:rPr lang="en-US" smtClean="0"/>
-              <a:t>2/14/2023</a:t>
+              <a:t>2/16/2023</a:t>
             </a:fld>
             <a:endParaRPr lang="en-US" dirty="0"/>
           </a:p>
@@ -6809,7 +6809,7 @@
           <a:p>
             <a:fld id="{473CFAA9-6D59-4D98-869E-ACBDB83B2CA4}" type="datetime1">
               <a:rPr lang="en-US" smtClean="0"/>
-              <a:t>2/14/2023</a:t>
+              <a:t>2/16/2023</a:t>
             </a:fld>
             <a:endParaRPr lang="en-US"/>
           </a:p>
@@ -7601,7 +7601,7 @@
           <a:p>
             <a:fld id="{DC410804-27E3-430A-BB42-B831260DE39A}" type="datetime1">
               <a:rPr lang="en-US" smtClean="0"/>
-              <a:t>2/14/2023</a:t>
+              <a:t>2/16/2023</a:t>
             </a:fld>
             <a:endParaRPr lang="en-US" dirty="0"/>
           </a:p>
@@ -8372,7 +8372,7 @@
           <a:p>
             <a:fld id="{60E22DE3-3D1A-4D53-B9A6-6C7463B8C992}" type="datetime1">
               <a:rPr lang="en-US" smtClean="0"/>
-              <a:t>2/14/2023</a:t>
+              <a:t>2/16/2023</a:t>
             </a:fld>
             <a:endParaRPr lang="en-US" dirty="0"/>
           </a:p>
@@ -8683,7 +8683,7 @@
             <a:fld id="{5ECD8B30-1B71-45A1-8314-D59C86F581E1}" type="datetime1">
               <a:rPr lang="en-US" smtClean="0"/>
               <a:pPr/>
-              <a:t>2/14/2023</a:t>
+              <a:t>2/16/2023</a:t>
             </a:fld>
             <a:endParaRPr lang="en-US" b="1" dirty="0"/>
           </a:p>
@@ -10356,12 +10356,12 @@
         <p:spPr>
           <a:xfrm>
             <a:off x="838199" y="1825625"/>
-            <a:ext cx="10689077" cy="4351338"/>
+            <a:ext cx="10689077" cy="4667250"/>
           </a:xfrm>
         </p:spPr>
         <p:txBody>
           <a:bodyPr>
-            <a:normAutofit fontScale="92500" lnSpcReduction="10000"/>
+            <a:normAutofit lnSpcReduction="10000"/>
           </a:bodyPr>
           <a:lstStyle/>
           <a:p>
@@ -10374,7 +10374,7 @@
               <a:t>Get the docker container up and going</a:t>
             </a:r>
             <a:br>
-              <a:rPr lang="en-CA" dirty="0"/>
+              <a:rPr lang="en-US" sz="2800" b="1" dirty="0"/>
             </a:br>
             <a:endParaRPr lang="en-CA" dirty="0"/>
           </a:p>
@@ -10475,18 +10475,18 @@
               <a:rPr lang="en-CA" dirty="0"/>
             </a:br>
             <a:r>
-              <a:rPr lang="en-CA" dirty="0"/>
+              <a:rPr lang="en-CA" sz="2400" dirty="0"/>
               <a:t>	</a:t>
             </a:r>
             <a:r>
-              <a:rPr lang="en-CA" b="1" dirty="0"/>
+              <a:rPr lang="en-CA" sz="2400" b="1" dirty="0"/>
               <a:t>viz </a:t>
             </a:r>
             <a:r>
-              <a:rPr lang="en-CA" b="1" dirty="0" err="1"/>
+              <a:rPr lang="en-CA" sz="2400" b="1" dirty="0" err="1"/>
               <a:t>data.json</a:t>
             </a:r>
-            <a:endParaRPr lang="en-CA" dirty="0"/>
+            <a:endParaRPr lang="en-CA" sz="2400" dirty="0"/>
           </a:p>
         </p:txBody>
       </p:sp>
@@ -10604,6 +10604,27 @@
               <a:rPr lang="en-CA" sz="2800" dirty="0"/>
               <a:t>http://editor.planning.domains/planning-course/rddl/v2</a:t>
             </a:r>
+          </a:p>
+          <a:p>
+            <a:pPr marL="0" indent="0" algn="ctr">
+              <a:buNone/>
+            </a:pPr>
+            <a:br>
+              <a:rPr lang="en-US" sz="2800" b="1" dirty="0"/>
+            </a:br>
+            <a:r>
+              <a:rPr lang="en-US" sz="2800" b="1" dirty="0"/>
+              <a:t>fetch-exercise </a:t>
+            </a:r>
+            <a:r>
+              <a:rPr lang="en-US" sz="2800" b="1" dirty="0" err="1"/>
+              <a:t>rddl</a:t>
+            </a:r>
+            <a:r>
+              <a:rPr lang="en-US" sz="2800" b="1" dirty="0"/>
+              <a:t> v2</a:t>
+            </a:r>
+            <a:endParaRPr lang="en-CA" sz="2800" dirty="0"/>
           </a:p>
           <a:p>
             <a:pPr marL="0" indent="0">
@@ -12416,6 +12437,30 @@
               <a:rPr lang="en-CA" sz="2800" dirty="0"/>
               <a:t>http://editor.planning.domains/planning-course/rddl/starter</a:t>
             </a:r>
+          </a:p>
+          <a:p>
+            <a:pPr marL="0" indent="0" algn="ctr">
+              <a:buNone/>
+            </a:pPr>
+            <a:endParaRPr lang="en-CA" sz="2800" dirty="0"/>
+          </a:p>
+          <a:p>
+            <a:pPr marL="0" indent="0" algn="ctr">
+              <a:buNone/>
+            </a:pPr>
+            <a:r>
+              <a:rPr lang="en-CA" dirty="0"/>
+              <a:t>fetch-exercise </a:t>
+            </a:r>
+            <a:r>
+              <a:rPr lang="en-CA" dirty="0" err="1"/>
+              <a:t>rddl</a:t>
+            </a:r>
+            <a:r>
+              <a:rPr lang="en-CA" dirty="0"/>
+              <a:t> starter</a:t>
+            </a:r>
+            <a:endParaRPr lang="en-CA" sz="2800" dirty="0"/>
           </a:p>
         </p:txBody>
       </p:sp>

</xml_diff>

<commit_message>
Touched up fetch script and updated ppos/rddl exercises.
</commit_message>
<xml_diff>
--- a/exercises/cisc-813/rddl/slides.pptx
+++ b/exercises/cisc-813/rddl/slides.pptx
@@ -28,15 +28,16 @@
     <p:sldId id="1718" r:id="rId22"/>
     <p:sldId id="1719" r:id="rId23"/>
     <p:sldId id="1720" r:id="rId24"/>
-    <p:sldId id="1695" r:id="rId25"/>
-    <p:sldId id="1701" r:id="rId26"/>
-    <p:sldId id="1696" r:id="rId27"/>
-    <p:sldId id="1702" r:id="rId28"/>
-    <p:sldId id="1697" r:id="rId29"/>
-    <p:sldId id="1703" r:id="rId30"/>
-    <p:sldId id="1698" r:id="rId31"/>
-    <p:sldId id="1704" r:id="rId32"/>
-    <p:sldId id="1684" r:id="rId33"/>
+    <p:sldId id="1725" r:id="rId25"/>
+    <p:sldId id="1695" r:id="rId26"/>
+    <p:sldId id="1701" r:id="rId27"/>
+    <p:sldId id="1696" r:id="rId28"/>
+    <p:sldId id="1702" r:id="rId29"/>
+    <p:sldId id="1697" r:id="rId30"/>
+    <p:sldId id="1703" r:id="rId31"/>
+    <p:sldId id="1698" r:id="rId32"/>
+    <p:sldId id="1704" r:id="rId33"/>
+    <p:sldId id="1684" r:id="rId34"/>
   </p:sldIdLst>
   <p:sldSz cx="12192000" cy="6858000"/>
   <p:notesSz cx="6858000" cy="9144000"/>
@@ -709,7 +710,7 @@
           <a:p>
             <a:fld id="{D6D0F569-AC90-44EB-9EF4-4E5C2F5D823C}" type="datetime1">
               <a:rPr lang="en-US" smtClean="0"/>
-              <a:t>3/23/2023</a:t>
+              <a:t>10/19/2023</a:t>
             </a:fld>
             <a:endParaRPr lang="en-US" dirty="0"/>
           </a:p>
@@ -1388,7 +1389,7 @@
           <a:p>
             <a:fld id="{46BA7D41-E8B7-4A0B-B861-3EC4AE88917D}" type="datetime1">
               <a:rPr lang="en-US" smtClean="0"/>
-              <a:t>3/23/2023</a:t>
+              <a:t>10/19/2023</a:t>
             </a:fld>
             <a:endParaRPr lang="en-US" dirty="0"/>
           </a:p>
@@ -2077,7 +2078,7 @@
           <a:p>
             <a:fld id="{A7C34823-0B19-4B4E-A643-7A3B0A3D24D6}" type="datetime1">
               <a:rPr lang="en-US" smtClean="0"/>
-              <a:t>3/23/2023</a:t>
+              <a:t>10/19/2023</a:t>
             </a:fld>
             <a:endParaRPr lang="en-US" dirty="0"/>
           </a:p>
@@ -3200,7 +3201,7 @@
           <a:p>
             <a:fld id="{8C2D79EF-17C8-45D8-9866-DAF5723FC604}" type="datetime1">
               <a:rPr lang="en-US" smtClean="0"/>
-              <a:t>3/23/2023</a:t>
+              <a:t>10/19/2023</a:t>
             </a:fld>
             <a:endParaRPr lang="en-US" dirty="0"/>
           </a:p>
@@ -3955,7 +3956,7 @@
           <a:p>
             <a:fld id="{DFFC2ADC-3680-4013-A757-E4663495DB98}" type="datetime1">
               <a:rPr lang="en-US" smtClean="0"/>
-              <a:t>3/23/2023</a:t>
+              <a:t>10/19/2023</a:t>
             </a:fld>
             <a:endParaRPr lang="en-US" dirty="0"/>
           </a:p>
@@ -4702,7 +4703,7 @@
           <a:p>
             <a:fld id="{4751BA94-5DCA-4F19-960F-0FB2BD5EE85A}" type="datetime1">
               <a:rPr lang="en-US" smtClean="0"/>
-              <a:t>3/23/2023</a:t>
+              <a:t>10/19/2023</a:t>
             </a:fld>
             <a:endParaRPr lang="en-US" dirty="0"/>
           </a:p>
@@ -5596,7 +5597,7 @@
           <a:p>
             <a:fld id="{01BED947-38D9-44AC-8B89-E79758333B77}" type="datetime1">
               <a:rPr lang="en-US" smtClean="0"/>
-              <a:t>3/23/2023</a:t>
+              <a:t>10/19/2023</a:t>
             </a:fld>
             <a:endParaRPr lang="en-US" dirty="0"/>
           </a:p>
@@ -6217,7 +6218,7 @@
           <a:p>
             <a:fld id="{3781E23F-BD3C-4F23-B116-2B758120C8AC}" type="datetime1">
               <a:rPr lang="en-US" smtClean="0"/>
-              <a:t>3/23/2023</a:t>
+              <a:t>10/19/2023</a:t>
             </a:fld>
             <a:endParaRPr lang="en-US" dirty="0"/>
           </a:p>
@@ -6809,7 +6810,7 @@
           <a:p>
             <a:fld id="{473CFAA9-6D59-4D98-869E-ACBDB83B2CA4}" type="datetime1">
               <a:rPr lang="en-US" smtClean="0"/>
-              <a:t>3/23/2023</a:t>
+              <a:t>10/19/2023</a:t>
             </a:fld>
             <a:endParaRPr lang="en-US"/>
           </a:p>
@@ -7601,7 +7602,7 @@
           <a:p>
             <a:fld id="{DC410804-27E3-430A-BB42-B831260DE39A}" type="datetime1">
               <a:rPr lang="en-US" smtClean="0"/>
-              <a:t>3/23/2023</a:t>
+              <a:t>10/19/2023</a:t>
             </a:fld>
             <a:endParaRPr lang="en-US" dirty="0"/>
           </a:p>
@@ -8372,7 +8373,7 @@
           <a:p>
             <a:fld id="{60E22DE3-3D1A-4D53-B9A6-6C7463B8C992}" type="datetime1">
               <a:rPr lang="en-US" smtClean="0"/>
-              <a:t>3/23/2023</a:t>
+              <a:t>10/19/2023</a:t>
             </a:fld>
             <a:endParaRPr lang="en-US" dirty="0"/>
           </a:p>
@@ -8683,7 +8684,7 @@
             <a:fld id="{5ECD8B30-1B71-45A1-8314-D59C86F581E1}" type="datetime1">
               <a:rPr lang="en-US" smtClean="0"/>
               <a:pPr/>
-              <a:t>3/23/2023</a:t>
+              <a:t>10/19/2023</a:t>
             </a:fld>
             <a:endParaRPr lang="en-US" b="1" dirty="0"/>
           </a:p>
@@ -9986,12 +9987,12 @@
           </a:p>
           <a:p>
             <a:r>
+              <a:rPr lang="en-US" i="1" dirty="0"/>
+              <a:t>Google </a:t>
+            </a:r>
+            <a:r>
               <a:rPr lang="en-US" i="1" dirty="0" err="1"/>
-              <a:t>VSCode</a:t>
-            </a:r>
-            <a:r>
-              <a:rPr lang="en-US" i="1" dirty="0"/>
-              <a:t> + PDDL Plugin</a:t>
+              <a:t>Colab</a:t>
             </a:r>
             <a:br>
               <a:rPr lang="en-US" i="1" dirty="0"/>
@@ -10015,8 +10016,13 @@
             </a:r>
             <a:r>
               <a:rPr lang="en-US" i="1" dirty="0"/>
-              <a:t> + PROST</a:t>
-            </a:r>
+              <a:t> + </a:t>
+            </a:r>
+            <a:r>
+              <a:rPr lang="en-US" i="1" dirty="0" err="1"/>
+              <a:t>JaxPlanner</a:t>
+            </a:r>
+            <a:endParaRPr lang="en-US" i="1" dirty="0"/>
           </a:p>
         </p:txBody>
       </p:sp>
@@ -10292,7 +10298,7 @@
 </file>
 
 <file path=ppt/slides/slide23.xml><?xml version="1.0" encoding="utf-8"?>
-<p:sld xmlns:a="http://schemas.openxmlformats.org/drawingml/2006/main" xmlns:r="http://schemas.openxmlformats.org/officeDocument/2006/relationships" xmlns:p="http://schemas.openxmlformats.org/presentationml/2006/main" showMasterSp="0">
+<p:sld xmlns:a="http://schemas.openxmlformats.org/drawingml/2006/main" xmlns:r="http://schemas.openxmlformats.org/officeDocument/2006/relationships" xmlns:p="http://schemas.openxmlformats.org/presentationml/2006/main" showMasterSp="0" show="0">
   <p:cSld>
     <p:spTree>
       <p:nvGrpSpPr>
@@ -10504,7 +10510,7 @@
 </file>
 
 <file path=ppt/slides/slide24.xml><?xml version="1.0" encoding="utf-8"?>
-<p:sld xmlns:a="http://schemas.openxmlformats.org/drawingml/2006/main" xmlns:r="http://schemas.openxmlformats.org/officeDocument/2006/relationships" xmlns:p="http://schemas.openxmlformats.org/presentationml/2006/main" showMasterSp="0">
+<p:sld xmlns:a="http://schemas.openxmlformats.org/drawingml/2006/main" xmlns:r="http://schemas.openxmlformats.org/officeDocument/2006/relationships" xmlns:p="http://schemas.openxmlformats.org/presentationml/2006/main">
   <p:cSld>
     <p:spTree>
       <p:nvGrpSpPr>
@@ -10522,10 +10528,10 @@
       </p:grpSpPr>
       <p:sp>
         <p:nvSpPr>
-          <p:cNvPr id="4" name="Title 3">
+          <p:cNvPr id="2" name="Title 1">
             <a:extLst>
               <a:ext uri="{FF2B5EF4-FFF2-40B4-BE49-F238E27FC236}">
-                <a16:creationId xmlns:a16="http://schemas.microsoft.com/office/drawing/2014/main" id="{80EAC0C6-7B8A-1444-CF6E-AFD7613F9128}"/>
+                <a16:creationId xmlns:a16="http://schemas.microsoft.com/office/drawing/2014/main" id="{1625D9CE-03C8-77E4-5476-5BA4F0BB300C}"/>
               </a:ext>
             </a:extLst>
           </p:cNvPr>
@@ -10542,12 +10548,8 @@
           <a:lstStyle/>
           <a:p>
             <a:r>
-              <a:rPr lang="en-CA" dirty="0"/>
-              <a:t>2. </a:t>
-            </a:r>
-            <a:r>
               <a:rPr lang="en-US" dirty="0"/>
-              <a:t>Fire out when no fuel</a:t>
+              <a:t>Let’s put out some fires!!!</a:t>
             </a:r>
             <a:endParaRPr lang="en-CA" dirty="0"/>
           </a:p>
@@ -10555,10 +10557,10 @@
       </p:sp>
       <p:sp>
         <p:nvSpPr>
-          <p:cNvPr id="5" name="Content Placeholder 4">
+          <p:cNvPr id="3" name="Content Placeholder 2">
             <a:extLst>
               <a:ext uri="{FF2B5EF4-FFF2-40B4-BE49-F238E27FC236}">
-                <a16:creationId xmlns:a16="http://schemas.microsoft.com/office/drawing/2014/main" id="{916B2140-6178-6477-FAC2-4FC081B9C2C5}"/>
+                <a16:creationId xmlns:a16="http://schemas.microsoft.com/office/drawing/2014/main" id="{D3B74232-B363-91B5-1EC5-11EA0258A32E}"/>
               </a:ext>
             </a:extLst>
           </p:cNvPr>
@@ -10569,59 +10571,56 @@
             <p:ph idx="1"/>
           </p:nvPr>
         </p:nvSpPr>
-        <p:spPr/>
+        <p:spPr>
+          <a:xfrm>
+            <a:off x="838199" y="1825625"/>
+            <a:ext cx="10689077" cy="4667250"/>
+          </a:xfrm>
+        </p:spPr>
         <p:txBody>
-          <a:bodyPr/>
+          <a:bodyPr>
+            <a:normAutofit/>
+          </a:bodyPr>
           <a:lstStyle/>
           <a:p>
-            <a:r>
-              <a:rPr lang="en-US" dirty="0"/>
-              <a:t>In the original, note that a fire only stops burning when it is put-out.</a:t>
-            </a:r>
-            <a:br>
-              <a:rPr lang="en-US" dirty="0"/>
-            </a:br>
-            <a:endParaRPr lang="en-US" dirty="0"/>
-          </a:p>
-          <a:p>
-            <a:r>
-              <a:rPr lang="en-US" dirty="0"/>
-              <a:t>Modify it so that a cell stops burning as soon as it is out of fuel.</a:t>
-            </a:r>
-            <a:endParaRPr lang="en-CA" dirty="0"/>
-          </a:p>
-          <a:p>
-            <a:endParaRPr lang="en-CA" dirty="0"/>
-          </a:p>
-          <a:p>
-            <a:endParaRPr lang="en-CA" dirty="0"/>
+            <a:pPr marL="0" indent="0">
+              <a:buNone/>
+            </a:pPr>
+            <a:endParaRPr lang="en-CA" sz="2400" dirty="0"/>
+          </a:p>
+          <a:p>
+            <a:pPr marL="0" indent="0">
+              <a:buNone/>
+            </a:pPr>
+            <a:endParaRPr lang="en-CA" sz="2400" dirty="0"/>
+          </a:p>
+          <a:p>
+            <a:pPr marL="0" indent="0">
+              <a:buNone/>
+            </a:pPr>
+            <a:endParaRPr lang="en-CA" sz="2400" dirty="0"/>
+          </a:p>
+          <a:p>
+            <a:pPr marL="0" indent="0">
+              <a:buNone/>
+            </a:pPr>
+            <a:endParaRPr lang="en-CA" sz="2400" dirty="0"/>
           </a:p>
           <a:p>
             <a:pPr marL="0" indent="0" algn="ctr">
               <a:buNone/>
             </a:pPr>
             <a:r>
-              <a:rPr lang="en-US" sz="2800" dirty="0" err="1"/>
-              <a:t>rddl</a:t>
-            </a:r>
-            <a:r>
-              <a:rPr lang="en-US" sz="2800" dirty="0"/>
-              <a:t>  /  v2</a:t>
-            </a:r>
-            <a:endParaRPr lang="en-CA" sz="2800" dirty="0"/>
-          </a:p>
-          <a:p>
-            <a:pPr marL="0" indent="0">
-              <a:buNone/>
-            </a:pPr>
-            <a:endParaRPr lang="en-CA" dirty="0"/>
+              <a:rPr lang="en-CA" sz="3600" dirty="0"/>
+              <a:t>mulab.ai/cisc-813/rddl</a:t>
+            </a:r>
           </a:p>
         </p:txBody>
       </p:sp>
     </p:spTree>
     <p:extLst>
       <p:ext uri="{BB962C8B-B14F-4D97-AF65-F5344CB8AC3E}">
-        <p14:creationId xmlns:p14="http://schemas.microsoft.com/office/powerpoint/2010/main" val="1445019752"/>
+        <p14:creationId xmlns:p14="http://schemas.microsoft.com/office/powerpoint/2010/main" val="735995901"/>
       </p:ext>
     </p:extLst>
   </p:cSld>
@@ -10650,6 +10649,134 @@
       </p:grpSpPr>
       <p:sp>
         <p:nvSpPr>
+          <p:cNvPr id="4" name="Title 3">
+            <a:extLst>
+              <a:ext uri="{FF2B5EF4-FFF2-40B4-BE49-F238E27FC236}">
+                <a16:creationId xmlns:a16="http://schemas.microsoft.com/office/drawing/2014/main" id="{80EAC0C6-7B8A-1444-CF6E-AFD7613F9128}"/>
+              </a:ext>
+            </a:extLst>
+          </p:cNvPr>
+          <p:cNvSpPr>
+            <a:spLocks noGrp="1"/>
+          </p:cNvSpPr>
+          <p:nvPr>
+            <p:ph type="title"/>
+          </p:nvPr>
+        </p:nvSpPr>
+        <p:spPr/>
+        <p:txBody>
+          <a:bodyPr/>
+          <a:lstStyle/>
+          <a:p>
+            <a:r>
+              <a:rPr lang="en-CA" dirty="0"/>
+              <a:t>2. </a:t>
+            </a:r>
+            <a:r>
+              <a:rPr lang="en-US" dirty="0"/>
+              <a:t>Fire out when no fuel</a:t>
+            </a:r>
+            <a:endParaRPr lang="en-CA" dirty="0"/>
+          </a:p>
+        </p:txBody>
+      </p:sp>
+      <p:sp>
+        <p:nvSpPr>
+          <p:cNvPr id="5" name="Content Placeholder 4">
+            <a:extLst>
+              <a:ext uri="{FF2B5EF4-FFF2-40B4-BE49-F238E27FC236}">
+                <a16:creationId xmlns:a16="http://schemas.microsoft.com/office/drawing/2014/main" id="{916B2140-6178-6477-FAC2-4FC081B9C2C5}"/>
+              </a:ext>
+            </a:extLst>
+          </p:cNvPr>
+          <p:cNvSpPr>
+            <a:spLocks noGrp="1"/>
+          </p:cNvSpPr>
+          <p:nvPr>
+            <p:ph idx="1"/>
+          </p:nvPr>
+        </p:nvSpPr>
+        <p:spPr/>
+        <p:txBody>
+          <a:bodyPr/>
+          <a:lstStyle/>
+          <a:p>
+            <a:r>
+              <a:rPr lang="en-US" dirty="0"/>
+              <a:t>In the original, note that a fire only stops burning when it is put-out.</a:t>
+            </a:r>
+            <a:br>
+              <a:rPr lang="en-US" dirty="0"/>
+            </a:br>
+            <a:endParaRPr lang="en-US" dirty="0"/>
+          </a:p>
+          <a:p>
+            <a:r>
+              <a:rPr lang="en-US" dirty="0"/>
+              <a:t>Modify it so that a cell stops burning as soon as it is out of fuel.</a:t>
+            </a:r>
+            <a:endParaRPr lang="en-CA" dirty="0"/>
+          </a:p>
+          <a:p>
+            <a:endParaRPr lang="en-CA" dirty="0"/>
+          </a:p>
+          <a:p>
+            <a:endParaRPr lang="en-CA" dirty="0"/>
+          </a:p>
+          <a:p>
+            <a:pPr marL="0" indent="0" algn="ctr">
+              <a:buNone/>
+            </a:pPr>
+            <a:r>
+              <a:rPr lang="en-US" sz="2800" dirty="0" err="1"/>
+              <a:t>rddl</a:t>
+            </a:r>
+            <a:r>
+              <a:rPr lang="en-US" sz="2800" dirty="0"/>
+              <a:t>  /  v2</a:t>
+            </a:r>
+            <a:endParaRPr lang="en-CA" sz="2800" dirty="0"/>
+          </a:p>
+          <a:p>
+            <a:pPr marL="0" indent="0">
+              <a:buNone/>
+            </a:pPr>
+            <a:endParaRPr lang="en-CA" dirty="0"/>
+          </a:p>
+        </p:txBody>
+      </p:sp>
+    </p:spTree>
+    <p:extLst>
+      <p:ext uri="{BB962C8B-B14F-4D97-AF65-F5344CB8AC3E}">
+        <p14:creationId xmlns:p14="http://schemas.microsoft.com/office/powerpoint/2010/main" val="1445019752"/>
+      </p:ext>
+    </p:extLst>
+  </p:cSld>
+  <p:clrMapOvr>
+    <a:masterClrMapping/>
+  </p:clrMapOvr>
+</p:sld>
+</file>
+
+<file path=ppt/slides/slide26.xml><?xml version="1.0" encoding="utf-8"?>
+<p:sld xmlns:a="http://schemas.openxmlformats.org/drawingml/2006/main" xmlns:r="http://schemas.openxmlformats.org/officeDocument/2006/relationships" xmlns:p="http://schemas.openxmlformats.org/presentationml/2006/main" showMasterSp="0">
+  <p:cSld>
+    <p:spTree>
+      <p:nvGrpSpPr>
+        <p:cNvPr id="1" name=""/>
+        <p:cNvGrpSpPr/>
+        <p:nvPr/>
+      </p:nvGrpSpPr>
+      <p:grpSpPr>
+        <a:xfrm>
+          <a:off x="0" y="0"/>
+          <a:ext cx="0" cy="0"/>
+          <a:chOff x="0" y="0"/>
+          <a:chExt cx="0" cy="0"/>
+        </a:xfrm>
+      </p:grpSpPr>
+      <p:sp>
+        <p:nvSpPr>
           <p:cNvPr id="5" name="Content Placeholder 4">
             <a:extLst>
               <a:ext uri="{FF2B5EF4-FFF2-40B4-BE49-F238E27FC236}">
@@ -10720,7 +10847,7 @@
 </p:sld>
 </file>
 
-<file path=ppt/slides/slide26.xml><?xml version="1.0" encoding="utf-8"?>
+<file path=ppt/slides/slide27.xml><?xml version="1.0" encoding="utf-8"?>
 <p:sld xmlns:a="http://schemas.openxmlformats.org/drawingml/2006/main" xmlns:r="http://schemas.openxmlformats.org/officeDocument/2006/relationships" xmlns:p="http://schemas.openxmlformats.org/presentationml/2006/main" showMasterSp="0">
   <p:cSld>
     <p:spTree>
@@ -10860,7 +10987,7 @@
 </p:sld>
 </file>
 
-<file path=ppt/slides/slide27.xml><?xml version="1.0" encoding="utf-8"?>
+<file path=ppt/slides/slide28.xml><?xml version="1.0" encoding="utf-8"?>
 <p:sld xmlns:a="http://schemas.openxmlformats.org/drawingml/2006/main" xmlns:r="http://schemas.openxmlformats.org/officeDocument/2006/relationships" xmlns:p="http://schemas.openxmlformats.org/presentationml/2006/main" showMasterSp="0">
   <p:cSld>
     <p:spTree>
@@ -10949,7 +11076,7 @@
 </p:sld>
 </file>
 
-<file path=ppt/slides/slide28.xml><?xml version="1.0" encoding="utf-8"?>
+<file path=ppt/slides/slide29.xml><?xml version="1.0" encoding="utf-8"?>
 <p:sld xmlns:a="http://schemas.openxmlformats.org/drawingml/2006/main" xmlns:r="http://schemas.openxmlformats.org/officeDocument/2006/relationships" xmlns:p="http://schemas.openxmlformats.org/presentationml/2006/main" showMasterSp="0">
   <p:cSld>
     <p:spTree>
@@ -11099,95 +11226,6 @@
   <p:clrMapOvr>
     <a:masterClrMapping/>
   </p:clrMapOvr>
-</p:sld>
-</file>
-
-<file path=ppt/slides/slide29.xml><?xml version="1.0" encoding="utf-8"?>
-<p:sld xmlns:a="http://schemas.openxmlformats.org/drawingml/2006/main" xmlns:r="http://schemas.openxmlformats.org/officeDocument/2006/relationships" xmlns:p="http://schemas.openxmlformats.org/presentationml/2006/main" showMasterSp="0">
-  <p:cSld>
-    <p:spTree>
-      <p:nvGrpSpPr>
-        <p:cNvPr id="1" name=""/>
-        <p:cNvGrpSpPr/>
-        <p:nvPr/>
-      </p:nvGrpSpPr>
-      <p:grpSpPr>
-        <a:xfrm>
-          <a:off x="0" y="0"/>
-          <a:ext cx="0" cy="0"/>
-          <a:chOff x="0" y="0"/>
-          <a:chExt cx="0" cy="0"/>
-        </a:xfrm>
-      </p:grpSpPr>
-      <p:sp>
-        <p:nvSpPr>
-          <p:cNvPr id="5" name="Content Placeholder 4">
-            <a:extLst>
-              <a:ext uri="{FF2B5EF4-FFF2-40B4-BE49-F238E27FC236}">
-                <a16:creationId xmlns:a16="http://schemas.microsoft.com/office/drawing/2014/main" id="{916B2140-6178-6477-FAC2-4FC081B9C2C5}"/>
-              </a:ext>
-            </a:extLst>
-          </p:cNvPr>
-          <p:cNvSpPr>
-            <a:spLocks noGrp="1"/>
-          </p:cNvSpPr>
-          <p:nvPr>
-            <p:ph idx="1"/>
-          </p:nvPr>
-        </p:nvSpPr>
-        <p:spPr/>
-        <p:txBody>
-          <a:bodyPr/>
-          <a:lstStyle/>
-          <a:p>
-            <a:pPr marL="0" indent="0">
-              <a:buNone/>
-            </a:pPr>
-            <a:endParaRPr lang="en-CA" dirty="0"/>
-          </a:p>
-          <a:p>
-            <a:endParaRPr lang="en-CA" dirty="0"/>
-          </a:p>
-          <a:p>
-            <a:endParaRPr lang="en-CA" dirty="0"/>
-          </a:p>
-          <a:p>
-            <a:pPr marL="0" indent="0" algn="ctr">
-              <a:buNone/>
-            </a:pPr>
-            <a:r>
-              <a:rPr lang="en-CA" sz="2800" dirty="0" err="1"/>
-              <a:t>rddl</a:t>
-            </a:r>
-            <a:r>
-              <a:rPr lang="en-CA" sz="2800" dirty="0"/>
-              <a:t>  /  v4ed</a:t>
-            </a:r>
-          </a:p>
-        </p:txBody>
-      </p:sp>
-    </p:spTree>
-    <p:extLst>
-      <p:ext uri="{BB962C8B-B14F-4D97-AF65-F5344CB8AC3E}">
-        <p14:creationId xmlns:p14="http://schemas.microsoft.com/office/powerpoint/2010/main" val="646542654"/>
-      </p:ext>
-    </p:extLst>
-  </p:cSld>
-  <p:clrMapOvr>
-    <a:masterClrMapping/>
-  </p:clrMapOvr>
-  <mc:AlternateContent xmlns:mc="http://schemas.openxmlformats.org/markup-compatibility/2006" xmlns:p14="http://schemas.microsoft.com/office/powerpoint/2010/main">
-    <mc:Choice Requires="p14">
-      <p:transition spd="med" p14:dur="700">
-        <p:fade/>
-      </p:transition>
-    </mc:Choice>
-    <mc:Fallback xmlns="">
-      <p:transition spd="med">
-        <p:fade/>
-      </p:transition>
-    </mc:Fallback>
-  </mc:AlternateContent>
 </p:sld>
 </file>
 
@@ -11292,6 +11330,95 @@
       </p:grpSpPr>
       <p:sp>
         <p:nvSpPr>
+          <p:cNvPr id="5" name="Content Placeholder 4">
+            <a:extLst>
+              <a:ext uri="{FF2B5EF4-FFF2-40B4-BE49-F238E27FC236}">
+                <a16:creationId xmlns:a16="http://schemas.microsoft.com/office/drawing/2014/main" id="{916B2140-6178-6477-FAC2-4FC081B9C2C5}"/>
+              </a:ext>
+            </a:extLst>
+          </p:cNvPr>
+          <p:cNvSpPr>
+            <a:spLocks noGrp="1"/>
+          </p:cNvSpPr>
+          <p:nvPr>
+            <p:ph idx="1"/>
+          </p:nvPr>
+        </p:nvSpPr>
+        <p:spPr/>
+        <p:txBody>
+          <a:bodyPr/>
+          <a:lstStyle/>
+          <a:p>
+            <a:pPr marL="0" indent="0">
+              <a:buNone/>
+            </a:pPr>
+            <a:endParaRPr lang="en-CA" dirty="0"/>
+          </a:p>
+          <a:p>
+            <a:endParaRPr lang="en-CA" dirty="0"/>
+          </a:p>
+          <a:p>
+            <a:endParaRPr lang="en-CA" dirty="0"/>
+          </a:p>
+          <a:p>
+            <a:pPr marL="0" indent="0" algn="ctr">
+              <a:buNone/>
+            </a:pPr>
+            <a:r>
+              <a:rPr lang="en-CA" sz="2800" dirty="0" err="1"/>
+              <a:t>rddl</a:t>
+            </a:r>
+            <a:r>
+              <a:rPr lang="en-CA" sz="2800" dirty="0"/>
+              <a:t>  /  v4ed</a:t>
+            </a:r>
+          </a:p>
+        </p:txBody>
+      </p:sp>
+    </p:spTree>
+    <p:extLst>
+      <p:ext uri="{BB962C8B-B14F-4D97-AF65-F5344CB8AC3E}">
+        <p14:creationId xmlns:p14="http://schemas.microsoft.com/office/powerpoint/2010/main" val="646542654"/>
+      </p:ext>
+    </p:extLst>
+  </p:cSld>
+  <p:clrMapOvr>
+    <a:masterClrMapping/>
+  </p:clrMapOvr>
+  <mc:AlternateContent xmlns:mc="http://schemas.openxmlformats.org/markup-compatibility/2006" xmlns:p14="http://schemas.microsoft.com/office/powerpoint/2010/main">
+    <mc:Choice Requires="p14">
+      <p:transition spd="med" p14:dur="700">
+        <p:fade/>
+      </p:transition>
+    </mc:Choice>
+    <mc:Fallback xmlns="">
+      <p:transition spd="med">
+        <p:fade/>
+      </p:transition>
+    </mc:Fallback>
+  </mc:AlternateContent>
+</p:sld>
+</file>
+
+<file path=ppt/slides/slide31.xml><?xml version="1.0" encoding="utf-8"?>
+<p:sld xmlns:a="http://schemas.openxmlformats.org/drawingml/2006/main" xmlns:r="http://schemas.openxmlformats.org/officeDocument/2006/relationships" xmlns:p="http://schemas.openxmlformats.org/presentationml/2006/main" showMasterSp="0">
+  <p:cSld>
+    <p:spTree>
+      <p:nvGrpSpPr>
+        <p:cNvPr id="1" name=""/>
+        <p:cNvGrpSpPr/>
+        <p:nvPr/>
+      </p:nvGrpSpPr>
+      <p:grpSpPr>
+        <a:xfrm>
+          <a:off x="0" y="0"/>
+          <a:ext cx="0" cy="0"/>
+          <a:chOff x="0" y="0"/>
+          <a:chExt cx="0" cy="0"/>
+        </a:xfrm>
+      </p:grpSpPr>
+      <p:sp>
+        <p:nvSpPr>
           <p:cNvPr id="4" name="Title 3">
             <a:extLst>
               <a:ext uri="{FF2B5EF4-FFF2-40B4-BE49-F238E27FC236}">
@@ -11423,7 +11550,7 @@
 </p:sld>
 </file>
 
-<file path=ppt/slides/slide31.xml><?xml version="1.0" encoding="utf-8"?>
+<file path=ppt/slides/slide32.xml><?xml version="1.0" encoding="utf-8"?>
 <p:sld xmlns:a="http://schemas.openxmlformats.org/drawingml/2006/main" xmlns:r="http://schemas.openxmlformats.org/officeDocument/2006/relationships" xmlns:p="http://schemas.openxmlformats.org/presentationml/2006/main" showMasterSp="0">
   <p:cSld>
     <p:spTree>
@@ -11512,7 +11639,7 @@
 </p:sld>
 </file>
 
-<file path=ppt/slides/slide32.xml><?xml version="1.0" encoding="utf-8"?>
+<file path=ppt/slides/slide33.xml><?xml version="1.0" encoding="utf-8"?>
 <p:sld xmlns:a="http://schemas.openxmlformats.org/drawingml/2006/main" xmlns:r="http://schemas.openxmlformats.org/officeDocument/2006/relationships" xmlns:p="http://schemas.openxmlformats.org/presentationml/2006/main" showMasterSp="0">
   <p:cSld>
     <p:spTree>
@@ -11661,7 +11788,7 @@
 </file>
 
 <file path=ppt/slides/slide5.xml><?xml version="1.0" encoding="utf-8"?>
-<p:sld xmlns:a="http://schemas.openxmlformats.org/drawingml/2006/main" xmlns:r="http://schemas.openxmlformats.org/officeDocument/2006/relationships" xmlns:p="http://schemas.openxmlformats.org/presentationml/2006/main">
+<p:sld xmlns:a="http://schemas.openxmlformats.org/drawingml/2006/main" xmlns:r="http://schemas.openxmlformats.org/officeDocument/2006/relationships" xmlns:p="http://schemas.openxmlformats.org/presentationml/2006/main" show="0">
   <p:cSld>
     <p:spTree>
       <p:nvGrpSpPr>
@@ -11839,7 +11966,7 @@
 </file>
 
 <file path=ppt/slides/slide6.xml><?xml version="1.0" encoding="utf-8"?>
-<p:sld xmlns:a="http://schemas.openxmlformats.org/drawingml/2006/main" xmlns:r="http://schemas.openxmlformats.org/officeDocument/2006/relationships" xmlns:p="http://schemas.openxmlformats.org/presentationml/2006/main">
+<p:sld xmlns:a="http://schemas.openxmlformats.org/drawingml/2006/main" xmlns:r="http://schemas.openxmlformats.org/officeDocument/2006/relationships" xmlns:p="http://schemas.openxmlformats.org/presentationml/2006/main" show="0">
   <p:cSld>
     <p:spTree>
       <p:nvGrpSpPr>
@@ -12013,13 +12140,13 @@
   <p:clrMapOvr>
     <a:masterClrMapping/>
   </p:clrMapOvr>
-  <mc:AlternateContent xmlns:mc="http://schemas.openxmlformats.org/markup-compatibility/2006" xmlns:p14="http://schemas.microsoft.com/office/powerpoint/2010/main">
-    <mc:Choice Requires="p14">
+  <mc:AlternateContent xmlns:mc="http://schemas.openxmlformats.org/markup-compatibility/2006">
+    <mc:Choice xmlns:p14="http://schemas.microsoft.com/office/powerpoint/2010/main" Requires="p14">
       <p:transition spd="med" p14:dur="700">
         <p:fade/>
       </p:transition>
     </mc:Choice>
-    <mc:Fallback xmlns="">
+    <mc:Fallback>
       <p:transition spd="med">
         <p:fade/>
       </p:transition>

</xml_diff>